<commit_message>
adicionando referencia na Apresentacao
</commit_message>
<xml_diff>
--- a/exercise5/presentation/Apresentacao.pptx
+++ b/exercise5/presentation/Apresentacao.pptx
@@ -19861,7 +19861,7 @@
         <p:spPr/>
         <p:txBody>
           <a:bodyPr>
-            <a:normAutofit fontScale="77500" lnSpcReduction="20000"/>
+            <a:normAutofit fontScale="70000" lnSpcReduction="20000"/>
           </a:bodyPr>
           <a:lstStyle/>
           <a:p>
@@ -20151,6 +20151,37 @@
               <a:rPr lang="en-US" b="1" dirty="0"/>
               <a:t>Semantic Code Repair using Neuro-Symbolic Transformation Networks.</a:t>
             </a:r>
+          </a:p>
+          <a:p>
+            <a:r>
+              <a:rPr lang="en-US" dirty="0"/>
+              <a:t>Antonio </a:t>
+            </a:r>
+            <a:r>
+              <a:rPr lang="en-US" dirty="0" err="1"/>
+              <a:t>Cavacini</a:t>
+            </a:r>
+            <a:r>
+              <a:rPr lang="en-US" dirty="0"/>
+              <a:t>. 2015. </a:t>
+            </a:r>
+            <a:r>
+              <a:rPr lang="en-US" b="1" dirty="0"/>
+              <a:t>What is the best database for computer science journal articles?</a:t>
+            </a:r>
+            <a:r>
+              <a:rPr lang="en-US" dirty="0"/>
+              <a:t>. </a:t>
+            </a:r>
+            <a:r>
+              <a:rPr lang="en-US" dirty="0" err="1"/>
+              <a:t>Scientometrics</a:t>
+            </a:r>
+            <a:r>
+              <a:rPr lang="en-US" dirty="0"/>
+              <a:t> 102, 3 (March 2015), 2059-2071. </a:t>
+            </a:r>
+            <a:endParaRPr lang="en-US" b="1" dirty="0"/>
           </a:p>
           <a:p>
             <a:endParaRPr lang="en-US" b="1" dirty="0"/>

</xml_diff>

<commit_message>
alteracao das palavras chaves
</commit_message>
<xml_diff>
--- a/exercise5/presentation/Apresentacao.pptx
+++ b/exercise5/presentation/Apresentacao.pptx
@@ -21,7 +21,7 @@
     <p:sldId id="260" r:id="rId9"/>
     <p:sldId id="262" r:id="rId10"/>
     <p:sldId id="261" r:id="rId11"/>
-    <p:sldId id="266" r:id="rId12"/>
+    <p:sldId id="270" r:id="rId12"/>
     <p:sldId id="263" r:id="rId13"/>
   </p:sldIdLst>
   <p:sldSz cx="12192000" cy="6858000"/>
@@ -12896,7 +12896,7 @@
           <a:p>
             <a:fld id="{98FF1703-66B5-C249-B7F1-1C15F5972029}" type="datetimeFigureOut">
               <a:rPr lang="en-US" smtClean="0"/>
-              <a:t>4/22/18</a:t>
+              <a:t>4/24/18</a:t>
             </a:fld>
             <a:endParaRPr lang="en-US"/>
           </a:p>
@@ -13074,7 +13074,7 @@
           <a:p>
             <a:fld id="{B87904F8-A166-1246-982B-8ABBE077CD52}" type="datetimeFigureOut">
               <a:rPr lang="en-US" smtClean="0"/>
-              <a:t>4/22/18</a:t>
+              <a:t>4/24/18</a:t>
             </a:fld>
             <a:endParaRPr lang="en-US"/>
           </a:p>
@@ -13489,7 +13489,7 @@
           <a:p>
             <a:fld id="{F860F8F4-B4DA-CA49-BE09-D5851EAEE1A1}" type="datetimeFigureOut">
               <a:rPr lang="en-US" smtClean="0"/>
-              <a:t>4/22/18</a:t>
+              <a:t>4/24/18</a:t>
             </a:fld>
             <a:endParaRPr lang="en-US"/>
           </a:p>
@@ -13687,7 +13687,7 @@
           <a:p>
             <a:fld id="{F860F8F4-B4DA-CA49-BE09-D5851EAEE1A1}" type="datetimeFigureOut">
               <a:rPr lang="en-US" smtClean="0"/>
-              <a:t>4/22/18</a:t>
+              <a:t>4/24/18</a:t>
             </a:fld>
             <a:endParaRPr lang="en-US"/>
           </a:p>
@@ -13895,7 +13895,7 @@
           <a:p>
             <a:fld id="{F860F8F4-B4DA-CA49-BE09-D5851EAEE1A1}" type="datetimeFigureOut">
               <a:rPr lang="en-US" smtClean="0"/>
-              <a:t>4/22/18</a:t>
+              <a:t>4/24/18</a:t>
             </a:fld>
             <a:endParaRPr lang="en-US"/>
           </a:p>
@@ -14093,7 +14093,7 @@
           <a:p>
             <a:fld id="{F860F8F4-B4DA-CA49-BE09-D5851EAEE1A1}" type="datetimeFigureOut">
               <a:rPr lang="en-US" smtClean="0"/>
-              <a:t>4/22/18</a:t>
+              <a:t>4/24/18</a:t>
             </a:fld>
             <a:endParaRPr lang="en-US"/>
           </a:p>
@@ -14368,7 +14368,7 @@
           <a:p>
             <a:fld id="{F860F8F4-B4DA-CA49-BE09-D5851EAEE1A1}" type="datetimeFigureOut">
               <a:rPr lang="en-US" smtClean="0"/>
-              <a:t>4/22/18</a:t>
+              <a:t>4/24/18</a:t>
             </a:fld>
             <a:endParaRPr lang="en-US"/>
           </a:p>
@@ -14633,7 +14633,7 @@
           <a:p>
             <a:fld id="{F860F8F4-B4DA-CA49-BE09-D5851EAEE1A1}" type="datetimeFigureOut">
               <a:rPr lang="en-US" smtClean="0"/>
-              <a:t>4/22/18</a:t>
+              <a:t>4/24/18</a:t>
             </a:fld>
             <a:endParaRPr lang="en-US"/>
           </a:p>
@@ -15045,7 +15045,7 @@
           <a:p>
             <a:fld id="{F860F8F4-B4DA-CA49-BE09-D5851EAEE1A1}" type="datetimeFigureOut">
               <a:rPr lang="en-US" smtClean="0"/>
-              <a:t>4/22/18</a:t>
+              <a:t>4/24/18</a:t>
             </a:fld>
             <a:endParaRPr lang="en-US"/>
           </a:p>
@@ -15186,7 +15186,7 @@
           <a:p>
             <a:fld id="{F860F8F4-B4DA-CA49-BE09-D5851EAEE1A1}" type="datetimeFigureOut">
               <a:rPr lang="en-US" smtClean="0"/>
-              <a:t>4/22/18</a:t>
+              <a:t>4/24/18</a:t>
             </a:fld>
             <a:endParaRPr lang="en-US"/>
           </a:p>
@@ -15299,7 +15299,7 @@
           <a:p>
             <a:fld id="{F860F8F4-B4DA-CA49-BE09-D5851EAEE1A1}" type="datetimeFigureOut">
               <a:rPr lang="en-US" smtClean="0"/>
-              <a:t>4/22/18</a:t>
+              <a:t>4/24/18</a:t>
             </a:fld>
             <a:endParaRPr lang="en-US"/>
           </a:p>
@@ -15610,7 +15610,7 @@
           <a:p>
             <a:fld id="{F860F8F4-B4DA-CA49-BE09-D5851EAEE1A1}" type="datetimeFigureOut">
               <a:rPr lang="en-US" smtClean="0"/>
-              <a:t>4/22/18</a:t>
+              <a:t>4/24/18</a:t>
             </a:fld>
             <a:endParaRPr lang="en-US"/>
           </a:p>
@@ -15898,7 +15898,7 @@
           <a:p>
             <a:fld id="{F860F8F4-B4DA-CA49-BE09-D5851EAEE1A1}" type="datetimeFigureOut">
               <a:rPr lang="en-US" smtClean="0"/>
-              <a:t>4/22/18</a:t>
+              <a:t>4/24/18</a:t>
             </a:fld>
             <a:endParaRPr lang="en-US"/>
           </a:p>
@@ -16139,7 +16139,7 @@
           <a:p>
             <a:fld id="{F860F8F4-B4DA-CA49-BE09-D5851EAEE1A1}" type="datetimeFigureOut">
               <a:rPr lang="en-US" smtClean="0"/>
-              <a:t>4/22/18</a:t>
+              <a:t>4/24/18</a:t>
             </a:fld>
             <a:endParaRPr lang="en-US"/>
           </a:p>
@@ -17198,7 +17198,7 @@
           <p:cNvPr id="2" name="Title 1">
             <a:extLst>
               <a:ext uri="{FF2B5EF4-FFF2-40B4-BE49-F238E27FC236}">
-                <a16:creationId xmlns:a16="http://schemas.microsoft.com/office/drawing/2014/main" id="{8365EE26-04B7-6443-B1A4-E8B0BAFF9517}"/>
+                <a16:creationId xmlns:a16="http://schemas.microsoft.com/office/drawing/2014/main" id="{9A980338-0587-D444-973C-468FE01B734B}"/>
               </a:ext>
             </a:extLst>
           </p:cNvPr>
@@ -17216,15 +17216,7 @@
           <a:p>
             <a:r>
               <a:rPr lang="en-US" dirty="0" err="1"/>
-              <a:t>Fluxo</a:t>
-            </a:r>
-            <a:r>
-              <a:rPr lang="en-US" dirty="0"/>
-              <a:t> do </a:t>
-            </a:r>
-            <a:r>
-              <a:rPr lang="en-US" dirty="0" err="1"/>
-              <a:t>sistema</a:t>
+              <a:t>Resultados</a:t>
             </a:r>
             <a:endParaRPr lang="en-US" dirty="0"/>
           </a:p>
@@ -17232,2561 +17224,269 @@
       </p:sp>
       <p:sp>
         <p:nvSpPr>
-          <p:cNvPr id="4" name="Rectangle 3">
+          <p:cNvPr id="10" name="Content Placeholder 9">
             <a:extLst>
               <a:ext uri="{FF2B5EF4-FFF2-40B4-BE49-F238E27FC236}">
-                <a16:creationId xmlns:a16="http://schemas.microsoft.com/office/drawing/2014/main" id="{687F2D0F-952F-2A42-99F5-EA601F15D002}"/>
+                <a16:creationId xmlns:a16="http://schemas.microsoft.com/office/drawing/2014/main" id="{4B8D5577-7C7E-F94F-A602-B30873E2108F}"/>
               </a:ext>
             </a:extLst>
           </p:cNvPr>
-          <p:cNvSpPr/>
-          <p:nvPr/>
+          <p:cNvSpPr>
+            <a:spLocks noGrp="1"/>
+          </p:cNvSpPr>
+          <p:nvPr>
+            <p:ph idx="1"/>
+          </p:nvPr>
         </p:nvSpPr>
-        <p:spPr>
-          <a:xfrm>
-            <a:off x="2171700" y="2830513"/>
-            <a:ext cx="622300" cy="736600"/>
-          </a:xfrm>
-          <a:prstGeom prst="rect">
-            <a:avLst/>
-          </a:prstGeom>
-          <a:noFill/>
-          <a:ln w="38100">
-            <a:solidFill>
-              <a:schemeClr val="tx1"/>
-            </a:solidFill>
-          </a:ln>
-        </p:spPr>
-        <p:style>
-          <a:lnRef idx="2">
-            <a:schemeClr val="accent6"/>
-          </a:lnRef>
-          <a:fillRef idx="1">
-            <a:schemeClr val="lt1"/>
-          </a:fillRef>
-          <a:effectRef idx="0">
-            <a:schemeClr val="accent6"/>
-          </a:effectRef>
-          <a:fontRef idx="minor">
-            <a:schemeClr val="dk1"/>
-          </a:fontRef>
-        </p:style>
+        <p:spPr/>
         <p:txBody>
-          <a:bodyPr rtlCol="0" anchor="ctr"/>
+          <a:bodyPr/>
           <a:lstStyle/>
           <a:p>
-            <a:pPr algn="ctr"/>
-            <a:endParaRPr lang="en-US"/>
-          </a:p>
-        </p:txBody>
-      </p:sp>
-      <p:sp>
-        <p:nvSpPr>
-          <p:cNvPr id="5" name="Rectangle 4">
-            <a:extLst>
-              <a:ext uri="{FF2B5EF4-FFF2-40B4-BE49-F238E27FC236}">
-                <a16:creationId xmlns:a16="http://schemas.microsoft.com/office/drawing/2014/main" id="{5102AB58-3FB2-8C4D-B643-C7A292718853}"/>
-              </a:ext>
-            </a:extLst>
-          </p:cNvPr>
-          <p:cNvSpPr/>
-          <p:nvPr/>
-        </p:nvSpPr>
-        <p:spPr>
-          <a:xfrm>
-            <a:off x="2012950" y="2971800"/>
-            <a:ext cx="622300" cy="736600"/>
-          </a:xfrm>
-          <a:prstGeom prst="rect">
-            <a:avLst/>
-          </a:prstGeom>
-          <a:solidFill>
-            <a:schemeClr val="bg1"/>
-          </a:solidFill>
-          <a:ln w="38100">
-            <a:solidFill>
-              <a:schemeClr val="tx1"/>
-            </a:solidFill>
-          </a:ln>
-        </p:spPr>
-        <p:style>
-          <a:lnRef idx="2">
-            <a:schemeClr val="accent6"/>
-          </a:lnRef>
-          <a:fillRef idx="1">
-            <a:schemeClr val="lt1"/>
-          </a:fillRef>
-          <a:effectRef idx="0">
-            <a:schemeClr val="accent6"/>
-          </a:effectRef>
-          <a:fontRef idx="minor">
-            <a:schemeClr val="dk1"/>
-          </a:fontRef>
-        </p:style>
-        <p:txBody>
-          <a:bodyPr rtlCol="0" anchor="ctr"/>
-          <a:lstStyle/>
-          <a:p>
-            <a:pPr algn="ctr"/>
-            <a:endParaRPr lang="en-US"/>
-          </a:p>
-        </p:txBody>
-      </p:sp>
-      <p:sp>
-        <p:nvSpPr>
-          <p:cNvPr id="6" name="Rectangle 5">
-            <a:extLst>
-              <a:ext uri="{FF2B5EF4-FFF2-40B4-BE49-F238E27FC236}">
-                <a16:creationId xmlns:a16="http://schemas.microsoft.com/office/drawing/2014/main" id="{0FD319DB-8AE1-254C-9CAE-8FF581CF45C9}"/>
-              </a:ext>
-            </a:extLst>
-          </p:cNvPr>
-          <p:cNvSpPr/>
-          <p:nvPr/>
-        </p:nvSpPr>
-        <p:spPr>
-          <a:xfrm>
-            <a:off x="1854200" y="3175000"/>
-            <a:ext cx="622300" cy="736600"/>
-          </a:xfrm>
-          <a:prstGeom prst="rect">
-            <a:avLst/>
-          </a:prstGeom>
-          <a:solidFill>
-            <a:schemeClr val="bg1"/>
-          </a:solidFill>
-          <a:ln w="38100">
-            <a:solidFill>
-              <a:schemeClr val="tx1"/>
-            </a:solidFill>
-          </a:ln>
-        </p:spPr>
-        <p:style>
-          <a:lnRef idx="2">
-            <a:schemeClr val="accent6"/>
-          </a:lnRef>
-          <a:fillRef idx="1">
-            <a:schemeClr val="lt1"/>
-          </a:fillRef>
-          <a:effectRef idx="0">
-            <a:schemeClr val="accent6"/>
-          </a:effectRef>
-          <a:fontRef idx="minor">
-            <a:schemeClr val="dk1"/>
-          </a:fontRef>
-        </p:style>
-        <p:txBody>
-          <a:bodyPr rtlCol="0" anchor="ctr"/>
-          <a:lstStyle/>
-          <a:p>
-            <a:pPr algn="ctr"/>
-            <a:endParaRPr lang="en-US"/>
-          </a:p>
-        </p:txBody>
-      </p:sp>
-      <p:sp>
-        <p:nvSpPr>
-          <p:cNvPr id="15" name="Right Arrow 14">
-            <a:extLst>
-              <a:ext uri="{FF2B5EF4-FFF2-40B4-BE49-F238E27FC236}">
-                <a16:creationId xmlns:a16="http://schemas.microsoft.com/office/drawing/2014/main" id="{787205E5-AE9A-0346-BDB3-8131647BCF62}"/>
-              </a:ext>
-            </a:extLst>
-          </p:cNvPr>
-          <p:cNvSpPr/>
-          <p:nvPr/>
-        </p:nvSpPr>
-        <p:spPr>
-          <a:xfrm rot="20012562">
-            <a:off x="2984500" y="2641600"/>
-            <a:ext cx="1308100" cy="673100"/>
-          </a:xfrm>
-          <a:prstGeom prst="rightArrow">
-            <a:avLst/>
-          </a:prstGeom>
-        </p:spPr>
-        <p:style>
-          <a:lnRef idx="2">
-            <a:schemeClr val="dk1">
-              <a:shade val="50000"/>
-            </a:schemeClr>
-          </a:lnRef>
-          <a:fillRef idx="1">
-            <a:schemeClr val="dk1"/>
-          </a:fillRef>
-          <a:effectRef idx="0">
-            <a:schemeClr val="dk1"/>
-          </a:effectRef>
-          <a:fontRef idx="minor">
-            <a:schemeClr val="lt1"/>
-          </a:fontRef>
-        </p:style>
-        <p:txBody>
-          <a:bodyPr rtlCol="0" anchor="ctr"/>
-          <a:lstStyle/>
-          <a:p>
-            <a:pPr algn="ctr"/>
-            <a:endParaRPr lang="en-US"/>
-          </a:p>
-        </p:txBody>
-      </p:sp>
-      <p:sp>
-        <p:nvSpPr>
-          <p:cNvPr id="31" name="Rectangle 30">
-            <a:extLst>
-              <a:ext uri="{FF2B5EF4-FFF2-40B4-BE49-F238E27FC236}">
-                <a16:creationId xmlns:a16="http://schemas.microsoft.com/office/drawing/2014/main" id="{54107C43-801A-A248-BFD1-0DFCB9F82BDE}"/>
-              </a:ext>
-            </a:extLst>
-          </p:cNvPr>
-          <p:cNvSpPr/>
-          <p:nvPr/>
-        </p:nvSpPr>
-        <p:spPr>
-          <a:xfrm>
-            <a:off x="4691543" y="2117726"/>
-            <a:ext cx="622300" cy="736600"/>
-          </a:xfrm>
-          <a:prstGeom prst="rect">
-            <a:avLst/>
-          </a:prstGeom>
-          <a:noFill/>
-          <a:ln w="38100">
-            <a:solidFill>
-              <a:schemeClr val="tx1"/>
-            </a:solidFill>
-          </a:ln>
-        </p:spPr>
-        <p:style>
-          <a:lnRef idx="2">
-            <a:schemeClr val="accent6"/>
-          </a:lnRef>
-          <a:fillRef idx="1">
-            <a:schemeClr val="lt1"/>
-          </a:fillRef>
-          <a:effectRef idx="0">
-            <a:schemeClr val="accent6"/>
-          </a:effectRef>
-          <a:fontRef idx="minor">
-            <a:schemeClr val="dk1"/>
-          </a:fontRef>
-        </p:style>
-        <p:txBody>
-          <a:bodyPr rtlCol="0" anchor="ctr"/>
-          <a:lstStyle/>
-          <a:p>
-            <a:pPr algn="ctr"/>
-            <a:endParaRPr lang="en-US"/>
-          </a:p>
-        </p:txBody>
-      </p:sp>
-      <p:sp>
-        <p:nvSpPr>
-          <p:cNvPr id="32" name="Rectangle 31">
-            <a:extLst>
-              <a:ext uri="{FF2B5EF4-FFF2-40B4-BE49-F238E27FC236}">
-                <a16:creationId xmlns:a16="http://schemas.microsoft.com/office/drawing/2014/main" id="{D18C6FDE-58F2-9F41-B4D9-0AAF1ABD7DE8}"/>
-              </a:ext>
-            </a:extLst>
-          </p:cNvPr>
-          <p:cNvSpPr/>
-          <p:nvPr/>
-        </p:nvSpPr>
-        <p:spPr>
-          <a:xfrm>
-            <a:off x="4532793" y="2259013"/>
-            <a:ext cx="622300" cy="736600"/>
-          </a:xfrm>
-          <a:prstGeom prst="rect">
-            <a:avLst/>
-          </a:prstGeom>
-          <a:solidFill>
-            <a:schemeClr val="bg1"/>
-          </a:solidFill>
-          <a:ln w="38100">
-            <a:solidFill>
-              <a:schemeClr val="tx1"/>
-            </a:solidFill>
-          </a:ln>
-        </p:spPr>
-        <p:style>
-          <a:lnRef idx="2">
-            <a:schemeClr val="accent6"/>
-          </a:lnRef>
-          <a:fillRef idx="1">
-            <a:schemeClr val="lt1"/>
-          </a:fillRef>
-          <a:effectRef idx="0">
-            <a:schemeClr val="accent6"/>
-          </a:effectRef>
-          <a:fontRef idx="minor">
-            <a:schemeClr val="dk1"/>
-          </a:fontRef>
-        </p:style>
-        <p:txBody>
-          <a:bodyPr rtlCol="0" anchor="ctr"/>
-          <a:lstStyle/>
-          <a:p>
-            <a:pPr algn="ctr"/>
-            <a:endParaRPr lang="en-US"/>
-          </a:p>
-        </p:txBody>
-      </p:sp>
-      <p:sp>
-        <p:nvSpPr>
-          <p:cNvPr id="33" name="Rectangle 32">
-            <a:extLst>
-              <a:ext uri="{FF2B5EF4-FFF2-40B4-BE49-F238E27FC236}">
-                <a16:creationId xmlns:a16="http://schemas.microsoft.com/office/drawing/2014/main" id="{AAFA1DD0-C2BC-844D-B195-0AEBE07B13D7}"/>
-              </a:ext>
-            </a:extLst>
-          </p:cNvPr>
-          <p:cNvSpPr/>
-          <p:nvPr/>
-        </p:nvSpPr>
-        <p:spPr>
-          <a:xfrm>
-            <a:off x="4374043" y="2462213"/>
-            <a:ext cx="622300" cy="736600"/>
-          </a:xfrm>
-          <a:prstGeom prst="rect">
-            <a:avLst/>
-          </a:prstGeom>
-          <a:solidFill>
-            <a:schemeClr val="bg1"/>
-          </a:solidFill>
-          <a:ln w="38100">
-            <a:solidFill>
-              <a:schemeClr val="tx1"/>
-            </a:solidFill>
-          </a:ln>
-        </p:spPr>
-        <p:style>
-          <a:lnRef idx="2">
-            <a:schemeClr val="accent6"/>
-          </a:lnRef>
-          <a:fillRef idx="1">
-            <a:schemeClr val="lt1"/>
-          </a:fillRef>
-          <a:effectRef idx="0">
-            <a:schemeClr val="accent6"/>
-          </a:effectRef>
-          <a:fontRef idx="minor">
-            <a:schemeClr val="dk1"/>
-          </a:fontRef>
-        </p:style>
-        <p:txBody>
-          <a:bodyPr rtlCol="0" anchor="ctr"/>
-          <a:lstStyle/>
-          <a:p>
-            <a:pPr algn="ctr"/>
-            <a:endParaRPr lang="en-US"/>
-          </a:p>
-        </p:txBody>
-      </p:sp>
-      <p:sp>
-        <p:nvSpPr>
-          <p:cNvPr id="34" name="TextBox 33">
-            <a:extLst>
-              <a:ext uri="{FF2B5EF4-FFF2-40B4-BE49-F238E27FC236}">
-                <a16:creationId xmlns:a16="http://schemas.microsoft.com/office/drawing/2014/main" id="{B111F148-11C5-8D4D-BF26-9E37E3507691}"/>
-              </a:ext>
-            </a:extLst>
-          </p:cNvPr>
-          <p:cNvSpPr txBox="1"/>
-          <p:nvPr/>
-        </p:nvSpPr>
-        <p:spPr>
-          <a:xfrm>
-            <a:off x="4412143" y="2616200"/>
-            <a:ext cx="781050" cy="369332"/>
-          </a:xfrm>
-          <a:prstGeom prst="rect">
-            <a:avLst/>
-          </a:prstGeom>
-          <a:noFill/>
-        </p:spPr>
-        <p:txBody>
-          <a:bodyPr wrap="square" rtlCol="0">
-            <a:spAutoFit/>
-          </a:bodyPr>
-          <a:lstStyle/>
-          <a:p>
-            <a:r>
-              <a:rPr lang="en-US" dirty="0"/>
-              <a:t>AST</a:t>
-            </a:r>
-          </a:p>
-        </p:txBody>
-      </p:sp>
-      <p:sp>
-        <p:nvSpPr>
-          <p:cNvPr id="35" name="Right Arrow 34">
-            <a:extLst>
-              <a:ext uri="{FF2B5EF4-FFF2-40B4-BE49-F238E27FC236}">
-                <a16:creationId xmlns:a16="http://schemas.microsoft.com/office/drawing/2014/main" id="{2E2E052E-49EC-9C40-B738-7801455D1DF6}"/>
-              </a:ext>
-            </a:extLst>
-          </p:cNvPr>
-          <p:cNvSpPr/>
-          <p:nvPr/>
-        </p:nvSpPr>
-        <p:spPr>
-          <a:xfrm rot="2371365">
-            <a:off x="2891318" y="3906396"/>
-            <a:ext cx="1308100" cy="673100"/>
-          </a:xfrm>
-          <a:prstGeom prst="rightArrow">
-            <a:avLst/>
-          </a:prstGeom>
-        </p:spPr>
-        <p:style>
-          <a:lnRef idx="2">
-            <a:schemeClr val="dk1">
-              <a:shade val="50000"/>
-            </a:schemeClr>
-          </a:lnRef>
-          <a:fillRef idx="1">
-            <a:schemeClr val="dk1"/>
-          </a:fillRef>
-          <a:effectRef idx="0">
-            <a:schemeClr val="dk1"/>
-          </a:effectRef>
-          <a:fontRef idx="minor">
-            <a:schemeClr val="lt1"/>
-          </a:fontRef>
-        </p:style>
-        <p:txBody>
-          <a:bodyPr rtlCol="0" anchor="ctr"/>
-          <a:lstStyle/>
-          <a:p>
-            <a:pPr algn="ctr"/>
-            <a:endParaRPr lang="en-US"/>
-          </a:p>
-        </p:txBody>
-      </p:sp>
-      <p:sp>
-        <p:nvSpPr>
-          <p:cNvPr id="37" name="Rectangle 36">
-            <a:extLst>
-              <a:ext uri="{FF2B5EF4-FFF2-40B4-BE49-F238E27FC236}">
-                <a16:creationId xmlns:a16="http://schemas.microsoft.com/office/drawing/2014/main" id="{B29C9B2D-6CC8-8B42-984C-0A280DC195C4}"/>
-              </a:ext>
-            </a:extLst>
-          </p:cNvPr>
-          <p:cNvSpPr/>
-          <p:nvPr/>
-        </p:nvSpPr>
-        <p:spPr>
-          <a:xfrm>
-            <a:off x="4532793" y="4306958"/>
-            <a:ext cx="622300" cy="736600"/>
-          </a:xfrm>
-          <a:prstGeom prst="rect">
-            <a:avLst/>
-          </a:prstGeom>
-          <a:noFill/>
-          <a:ln w="38100">
-            <a:solidFill>
-              <a:schemeClr val="tx1"/>
-            </a:solidFill>
-          </a:ln>
-        </p:spPr>
-        <p:style>
-          <a:lnRef idx="2">
-            <a:schemeClr val="accent6"/>
-          </a:lnRef>
-          <a:fillRef idx="1">
-            <a:schemeClr val="lt1"/>
-          </a:fillRef>
-          <a:effectRef idx="0">
-            <a:schemeClr val="accent6"/>
-          </a:effectRef>
-          <a:fontRef idx="minor">
-            <a:schemeClr val="dk1"/>
-          </a:fontRef>
-        </p:style>
-        <p:txBody>
-          <a:bodyPr rtlCol="0" anchor="ctr"/>
-          <a:lstStyle/>
-          <a:p>
-            <a:pPr algn="ctr"/>
-            <a:endParaRPr lang="en-US"/>
-          </a:p>
-        </p:txBody>
-      </p:sp>
-      <p:sp>
-        <p:nvSpPr>
-          <p:cNvPr id="38" name="Rectangle 37">
-            <a:extLst>
-              <a:ext uri="{FF2B5EF4-FFF2-40B4-BE49-F238E27FC236}">
-                <a16:creationId xmlns:a16="http://schemas.microsoft.com/office/drawing/2014/main" id="{CE171A33-8C61-914E-9A93-74E8EA6535C5}"/>
-              </a:ext>
-            </a:extLst>
-          </p:cNvPr>
-          <p:cNvSpPr/>
-          <p:nvPr/>
-        </p:nvSpPr>
-        <p:spPr>
-          <a:xfrm>
-            <a:off x="4374043" y="4448245"/>
-            <a:ext cx="622300" cy="736600"/>
-          </a:xfrm>
-          <a:prstGeom prst="rect">
-            <a:avLst/>
-          </a:prstGeom>
-          <a:solidFill>
-            <a:schemeClr val="bg1"/>
-          </a:solidFill>
-          <a:ln w="38100">
-            <a:solidFill>
-              <a:schemeClr val="tx1"/>
-            </a:solidFill>
-          </a:ln>
-        </p:spPr>
-        <p:style>
-          <a:lnRef idx="2">
-            <a:schemeClr val="accent6"/>
-          </a:lnRef>
-          <a:fillRef idx="1">
-            <a:schemeClr val="lt1"/>
-          </a:fillRef>
-          <a:effectRef idx="0">
-            <a:schemeClr val="accent6"/>
-          </a:effectRef>
-          <a:fontRef idx="minor">
-            <a:schemeClr val="dk1"/>
-          </a:fontRef>
-        </p:style>
-        <p:txBody>
-          <a:bodyPr rtlCol="0" anchor="ctr"/>
-          <a:lstStyle/>
-          <a:p>
-            <a:pPr algn="ctr"/>
-            <a:endParaRPr lang="en-US"/>
-          </a:p>
-        </p:txBody>
-      </p:sp>
-      <p:sp>
-        <p:nvSpPr>
-          <p:cNvPr id="39" name="Rectangle 38">
-            <a:extLst>
-              <a:ext uri="{FF2B5EF4-FFF2-40B4-BE49-F238E27FC236}">
-                <a16:creationId xmlns:a16="http://schemas.microsoft.com/office/drawing/2014/main" id="{4DF0D88F-9746-1847-B685-B862811D52BB}"/>
-              </a:ext>
-            </a:extLst>
-          </p:cNvPr>
-          <p:cNvSpPr/>
-          <p:nvPr/>
-        </p:nvSpPr>
-        <p:spPr>
-          <a:xfrm>
-            <a:off x="4215293" y="4651445"/>
-            <a:ext cx="622300" cy="736600"/>
-          </a:xfrm>
-          <a:prstGeom prst="rect">
-            <a:avLst/>
-          </a:prstGeom>
-          <a:solidFill>
-            <a:schemeClr val="bg1"/>
-          </a:solidFill>
-          <a:ln w="38100">
-            <a:solidFill>
-              <a:schemeClr val="tx1"/>
-            </a:solidFill>
-          </a:ln>
-        </p:spPr>
-        <p:style>
-          <a:lnRef idx="2">
-            <a:schemeClr val="accent6"/>
-          </a:lnRef>
-          <a:fillRef idx="1">
-            <a:schemeClr val="lt1"/>
-          </a:fillRef>
-          <a:effectRef idx="0">
-            <a:schemeClr val="accent6"/>
-          </a:effectRef>
-          <a:fontRef idx="minor">
-            <a:schemeClr val="dk1"/>
-          </a:fontRef>
-        </p:style>
-        <p:txBody>
-          <a:bodyPr rtlCol="0" anchor="ctr"/>
-          <a:lstStyle/>
-          <a:p>
-            <a:pPr algn="ctr"/>
-            <a:endParaRPr lang="en-US"/>
-          </a:p>
-        </p:txBody>
-      </p:sp>
-      <p:sp>
-        <p:nvSpPr>
-          <p:cNvPr id="40" name="TextBox 39">
-            <a:extLst>
-              <a:ext uri="{FF2B5EF4-FFF2-40B4-BE49-F238E27FC236}">
-                <a16:creationId xmlns:a16="http://schemas.microsoft.com/office/drawing/2014/main" id="{E66B5509-D4D4-B94E-8162-5D60AB92B05C}"/>
-              </a:ext>
-            </a:extLst>
-          </p:cNvPr>
-          <p:cNvSpPr txBox="1"/>
-          <p:nvPr/>
-        </p:nvSpPr>
-        <p:spPr>
-          <a:xfrm>
-            <a:off x="4296736" y="4817179"/>
-            <a:ext cx="650840" cy="369332"/>
-          </a:xfrm>
-          <a:prstGeom prst="rect">
-            <a:avLst/>
-          </a:prstGeom>
-          <a:noFill/>
-        </p:spPr>
-        <p:txBody>
-          <a:bodyPr wrap="square" rtlCol="0">
-            <a:spAutoFit/>
-          </a:bodyPr>
-          <a:lstStyle/>
-          <a:p>
-            <a:r>
-              <a:rPr lang="en-US" dirty="0"/>
-              <a:t>VT*</a:t>
-            </a:r>
-          </a:p>
-        </p:txBody>
-      </p:sp>
-      <p:sp>
-        <p:nvSpPr>
-          <p:cNvPr id="42" name="TextBox 41">
-            <a:extLst>
-              <a:ext uri="{FF2B5EF4-FFF2-40B4-BE49-F238E27FC236}">
-                <a16:creationId xmlns:a16="http://schemas.microsoft.com/office/drawing/2014/main" id="{AF393561-1702-984F-BBD5-3876FB89C535}"/>
-              </a:ext>
-            </a:extLst>
-          </p:cNvPr>
-          <p:cNvSpPr txBox="1"/>
-          <p:nvPr/>
-        </p:nvSpPr>
-        <p:spPr>
-          <a:xfrm>
-            <a:off x="1079500" y="5511800"/>
-            <a:ext cx="2184400" cy="369332"/>
-          </a:xfrm>
-          <a:prstGeom prst="rect">
-            <a:avLst/>
-          </a:prstGeom>
-          <a:noFill/>
-        </p:spPr>
-        <p:txBody>
-          <a:bodyPr wrap="square" rtlCol="0">
-            <a:spAutoFit/>
-          </a:bodyPr>
-          <a:lstStyle/>
-          <a:p>
-            <a:r>
-              <a:rPr lang="en-US" dirty="0"/>
-              <a:t>VT*: Variable Tracing</a:t>
-            </a:r>
-          </a:p>
-        </p:txBody>
-      </p:sp>
-      <p:sp>
-        <p:nvSpPr>
-          <p:cNvPr id="43" name="Right Arrow 42">
-            <a:extLst>
-              <a:ext uri="{FF2B5EF4-FFF2-40B4-BE49-F238E27FC236}">
-                <a16:creationId xmlns:a16="http://schemas.microsoft.com/office/drawing/2014/main" id="{A3E309C1-542F-0846-AA88-FB783B73F566}"/>
-              </a:ext>
-            </a:extLst>
-          </p:cNvPr>
-          <p:cNvSpPr/>
-          <p:nvPr/>
-        </p:nvSpPr>
-        <p:spPr>
-          <a:xfrm rot="2208543">
-            <a:off x="5390970" y="2683668"/>
-            <a:ext cx="1308100" cy="673100"/>
-          </a:xfrm>
-          <a:prstGeom prst="rightArrow">
-            <a:avLst/>
-          </a:prstGeom>
-        </p:spPr>
-        <p:style>
-          <a:lnRef idx="2">
-            <a:schemeClr val="dk1">
-              <a:shade val="50000"/>
-            </a:schemeClr>
-          </a:lnRef>
-          <a:fillRef idx="1">
-            <a:schemeClr val="dk1"/>
-          </a:fillRef>
-          <a:effectRef idx="0">
-            <a:schemeClr val="dk1"/>
-          </a:effectRef>
-          <a:fontRef idx="minor">
-            <a:schemeClr val="lt1"/>
-          </a:fontRef>
-        </p:style>
-        <p:txBody>
-          <a:bodyPr rtlCol="0" anchor="ctr"/>
-          <a:lstStyle/>
-          <a:p>
-            <a:pPr algn="ctr"/>
-            <a:endParaRPr lang="en-US"/>
-          </a:p>
-        </p:txBody>
-      </p:sp>
-      <p:sp>
-        <p:nvSpPr>
-          <p:cNvPr id="44" name="Right Arrow 43">
-            <a:extLst>
-              <a:ext uri="{FF2B5EF4-FFF2-40B4-BE49-F238E27FC236}">
-                <a16:creationId xmlns:a16="http://schemas.microsoft.com/office/drawing/2014/main" id="{C54AACCF-ACBB-3049-9A59-9B3063D46CE2}"/>
-              </a:ext>
-            </a:extLst>
-          </p:cNvPr>
-          <p:cNvSpPr/>
-          <p:nvPr/>
-        </p:nvSpPr>
-        <p:spPr>
-          <a:xfrm rot="19736492">
-            <a:off x="5247584" y="4039394"/>
-            <a:ext cx="1308100" cy="673100"/>
-          </a:xfrm>
-          <a:prstGeom prst="rightArrow">
-            <a:avLst/>
-          </a:prstGeom>
-        </p:spPr>
-        <p:style>
-          <a:lnRef idx="2">
-            <a:schemeClr val="dk1">
-              <a:shade val="50000"/>
-            </a:schemeClr>
-          </a:lnRef>
-          <a:fillRef idx="1">
-            <a:schemeClr val="dk1"/>
-          </a:fillRef>
-          <a:effectRef idx="0">
-            <a:schemeClr val="dk1"/>
-          </a:effectRef>
-          <a:fontRef idx="minor">
-            <a:schemeClr val="lt1"/>
-          </a:fontRef>
-        </p:style>
-        <p:txBody>
-          <a:bodyPr rtlCol="0" anchor="ctr"/>
-          <a:lstStyle/>
-          <a:p>
-            <a:pPr algn="ctr"/>
-            <a:endParaRPr lang="en-US"/>
-          </a:p>
-        </p:txBody>
-      </p:sp>
-      <p:sp>
-        <p:nvSpPr>
-          <p:cNvPr id="45" name="Rectangle 44">
-            <a:extLst>
-              <a:ext uri="{FF2B5EF4-FFF2-40B4-BE49-F238E27FC236}">
-                <a16:creationId xmlns:a16="http://schemas.microsoft.com/office/drawing/2014/main" id="{3681FB6F-DC21-EF40-B6E6-F04D9701DCDD}"/>
-              </a:ext>
-            </a:extLst>
-          </p:cNvPr>
-          <p:cNvSpPr/>
-          <p:nvPr/>
-        </p:nvSpPr>
-        <p:spPr>
-          <a:xfrm>
-            <a:off x="7117677" y="3198813"/>
-            <a:ext cx="622300" cy="736600"/>
-          </a:xfrm>
-          <a:prstGeom prst="rect">
-            <a:avLst/>
-          </a:prstGeom>
-          <a:noFill/>
-          <a:ln w="38100">
-            <a:solidFill>
-              <a:schemeClr val="tx1"/>
-            </a:solidFill>
-          </a:ln>
-        </p:spPr>
-        <p:style>
-          <a:lnRef idx="2">
-            <a:schemeClr val="accent6"/>
-          </a:lnRef>
-          <a:fillRef idx="1">
-            <a:schemeClr val="lt1"/>
-          </a:fillRef>
-          <a:effectRef idx="0">
-            <a:schemeClr val="accent6"/>
-          </a:effectRef>
-          <a:fontRef idx="minor">
-            <a:schemeClr val="dk1"/>
-          </a:fontRef>
-        </p:style>
-        <p:txBody>
-          <a:bodyPr rtlCol="0" anchor="ctr"/>
-          <a:lstStyle/>
-          <a:p>
-            <a:pPr algn="ctr"/>
-            <a:endParaRPr lang="en-US"/>
-          </a:p>
-        </p:txBody>
-      </p:sp>
-      <p:sp>
-        <p:nvSpPr>
-          <p:cNvPr id="46" name="Rectangle 45">
-            <a:extLst>
-              <a:ext uri="{FF2B5EF4-FFF2-40B4-BE49-F238E27FC236}">
-                <a16:creationId xmlns:a16="http://schemas.microsoft.com/office/drawing/2014/main" id="{6A511374-E622-884E-94E0-7175D548F752}"/>
-              </a:ext>
-            </a:extLst>
-          </p:cNvPr>
-          <p:cNvSpPr/>
-          <p:nvPr/>
-        </p:nvSpPr>
-        <p:spPr>
-          <a:xfrm>
-            <a:off x="6958927" y="3340100"/>
-            <a:ext cx="622300" cy="736600"/>
-          </a:xfrm>
-          <a:prstGeom prst="rect">
-            <a:avLst/>
-          </a:prstGeom>
-          <a:solidFill>
-            <a:schemeClr val="bg1"/>
-          </a:solidFill>
-          <a:ln w="38100">
-            <a:solidFill>
-              <a:schemeClr val="tx1"/>
-            </a:solidFill>
-          </a:ln>
-        </p:spPr>
-        <p:style>
-          <a:lnRef idx="2">
-            <a:schemeClr val="accent6"/>
-          </a:lnRef>
-          <a:fillRef idx="1">
-            <a:schemeClr val="lt1"/>
-          </a:fillRef>
-          <a:effectRef idx="0">
-            <a:schemeClr val="accent6"/>
-          </a:effectRef>
-          <a:fontRef idx="minor">
-            <a:schemeClr val="dk1"/>
-          </a:fontRef>
-        </p:style>
-        <p:txBody>
-          <a:bodyPr rtlCol="0" anchor="ctr"/>
-          <a:lstStyle/>
-          <a:p>
-            <a:pPr algn="ctr"/>
-            <a:endParaRPr lang="en-US"/>
-          </a:p>
-        </p:txBody>
-      </p:sp>
-      <p:sp>
-        <p:nvSpPr>
-          <p:cNvPr id="47" name="Rectangle 46">
-            <a:extLst>
-              <a:ext uri="{FF2B5EF4-FFF2-40B4-BE49-F238E27FC236}">
-                <a16:creationId xmlns:a16="http://schemas.microsoft.com/office/drawing/2014/main" id="{60DAF456-1801-3E4C-881A-EFB23E3BE617}"/>
-              </a:ext>
-            </a:extLst>
-          </p:cNvPr>
-          <p:cNvSpPr/>
-          <p:nvPr/>
-        </p:nvSpPr>
-        <p:spPr>
-          <a:xfrm>
-            <a:off x="6800177" y="3543300"/>
-            <a:ext cx="622300" cy="736600"/>
-          </a:xfrm>
-          <a:prstGeom prst="rect">
-            <a:avLst/>
-          </a:prstGeom>
-          <a:solidFill>
-            <a:schemeClr val="bg1"/>
-          </a:solidFill>
-          <a:ln w="38100">
-            <a:solidFill>
-              <a:schemeClr val="tx1"/>
-            </a:solidFill>
-          </a:ln>
-        </p:spPr>
-        <p:style>
-          <a:lnRef idx="2">
-            <a:schemeClr val="accent6"/>
-          </a:lnRef>
-          <a:fillRef idx="1">
-            <a:schemeClr val="lt1"/>
-          </a:fillRef>
-          <a:effectRef idx="0">
-            <a:schemeClr val="accent6"/>
-          </a:effectRef>
-          <a:fontRef idx="minor">
-            <a:schemeClr val="dk1"/>
-          </a:fontRef>
-        </p:style>
-        <p:txBody>
-          <a:bodyPr rtlCol="0" anchor="ctr"/>
-          <a:lstStyle/>
-          <a:p>
-            <a:pPr algn="ctr"/>
-            <a:endParaRPr lang="en-US"/>
-          </a:p>
-        </p:txBody>
-      </p:sp>
-      <p:sp>
-        <p:nvSpPr>
-          <p:cNvPr id="48" name="Right Arrow 47">
-            <a:extLst>
-              <a:ext uri="{FF2B5EF4-FFF2-40B4-BE49-F238E27FC236}">
-                <a16:creationId xmlns:a16="http://schemas.microsoft.com/office/drawing/2014/main" id="{F6B12A25-0713-B44E-A904-F8E5B1246194}"/>
-              </a:ext>
-            </a:extLst>
-          </p:cNvPr>
-          <p:cNvSpPr/>
-          <p:nvPr/>
-        </p:nvSpPr>
-        <p:spPr>
-          <a:xfrm>
-            <a:off x="7898727" y="3262313"/>
-            <a:ext cx="1308100" cy="673100"/>
-          </a:xfrm>
-          <a:prstGeom prst="rightArrow">
-            <a:avLst/>
-          </a:prstGeom>
-        </p:spPr>
-        <p:style>
-          <a:lnRef idx="2">
-            <a:schemeClr val="dk1">
-              <a:shade val="50000"/>
-            </a:schemeClr>
-          </a:lnRef>
-          <a:fillRef idx="1">
-            <a:schemeClr val="dk1"/>
-          </a:fillRef>
-          <a:effectRef idx="0">
-            <a:schemeClr val="dk1"/>
-          </a:effectRef>
-          <a:fontRef idx="minor">
-            <a:schemeClr val="lt1"/>
-          </a:fontRef>
-        </p:style>
-        <p:txBody>
-          <a:bodyPr rtlCol="0" anchor="ctr"/>
-          <a:lstStyle/>
-          <a:p>
-            <a:pPr algn="ctr"/>
-            <a:endParaRPr lang="en-US"/>
-          </a:p>
-        </p:txBody>
-      </p:sp>
-      <p:sp>
-        <p:nvSpPr>
-          <p:cNvPr id="49" name="TextBox 48">
-            <a:extLst>
-              <a:ext uri="{FF2B5EF4-FFF2-40B4-BE49-F238E27FC236}">
-                <a16:creationId xmlns:a16="http://schemas.microsoft.com/office/drawing/2014/main" id="{4BD0A609-531E-3940-9838-7ABEE732EBF0}"/>
-              </a:ext>
-            </a:extLst>
-          </p:cNvPr>
-          <p:cNvSpPr txBox="1"/>
-          <p:nvPr/>
-        </p:nvSpPr>
-        <p:spPr>
-          <a:xfrm>
-            <a:off x="1308100" y="4242946"/>
-            <a:ext cx="1594957" cy="646331"/>
-          </a:xfrm>
-          <a:prstGeom prst="rect">
-            <a:avLst/>
-          </a:prstGeom>
-          <a:noFill/>
-        </p:spPr>
-        <p:txBody>
-          <a:bodyPr wrap="square" rtlCol="0">
-            <a:spAutoFit/>
-          </a:bodyPr>
-          <a:lstStyle/>
-          <a:p>
+            <a:pPr marL="0" indent="0">
+              <a:buNone/>
+            </a:pPr>
             <a:r>
               <a:rPr lang="en-US" dirty="0" err="1"/>
-              <a:t>Códigos</a:t>
-            </a:r>
-            <a:r>
-              <a:rPr lang="en-US" dirty="0"/>
-              <a:t> </a:t>
-            </a:r>
-            <a:r>
-              <a:rPr lang="en-US" dirty="0" err="1"/>
-              <a:t>fontes</a:t>
-            </a:r>
-            <a:endParaRPr lang="en-US" dirty="0"/>
-          </a:p>
-          <a:p>
-            <a:r>
-              <a:rPr lang="en-US" dirty="0"/>
-              <a:t>do </a:t>
-            </a:r>
-            <a:r>
-              <a:rPr lang="en-US" dirty="0" err="1"/>
-              <a:t>CodeHunt</a:t>
-            </a:r>
-            <a:r>
-              <a:rPr lang="en-US" dirty="0"/>
-              <a:t> </a:t>
-            </a:r>
-          </a:p>
-        </p:txBody>
-      </p:sp>
-      <p:sp>
-        <p:nvSpPr>
-          <p:cNvPr id="50" name="TextBox 49">
-            <a:extLst>
-              <a:ext uri="{FF2B5EF4-FFF2-40B4-BE49-F238E27FC236}">
-                <a16:creationId xmlns:a16="http://schemas.microsoft.com/office/drawing/2014/main" id="{D875C363-F480-B24F-8323-E05E6E41E5E6}"/>
-              </a:ext>
-            </a:extLst>
-          </p:cNvPr>
-          <p:cNvSpPr txBox="1"/>
-          <p:nvPr/>
-        </p:nvSpPr>
-        <p:spPr>
-          <a:xfrm>
-            <a:off x="6421364" y="4372408"/>
-            <a:ext cx="1594957" cy="646331"/>
-          </a:xfrm>
-          <a:prstGeom prst="rect">
-            <a:avLst/>
-          </a:prstGeom>
-          <a:noFill/>
-        </p:spPr>
-        <p:txBody>
-          <a:bodyPr wrap="square" rtlCol="0">
-            <a:spAutoFit/>
-          </a:bodyPr>
-          <a:lstStyle/>
-          <a:p>
-            <a:r>
-              <a:rPr lang="en-US" dirty="0"/>
-              <a:t>Entrada para o RNN (input)</a:t>
-            </a:r>
-          </a:p>
-        </p:txBody>
-      </p:sp>
-      <p:sp>
-        <p:nvSpPr>
-          <p:cNvPr id="51" name="Oval 50">
-            <a:extLst>
-              <a:ext uri="{FF2B5EF4-FFF2-40B4-BE49-F238E27FC236}">
-                <a16:creationId xmlns:a16="http://schemas.microsoft.com/office/drawing/2014/main" id="{B40B8035-9624-5D40-8BC1-A5D47FD712DD}"/>
-              </a:ext>
-            </a:extLst>
-          </p:cNvPr>
-          <p:cNvSpPr/>
-          <p:nvPr/>
-        </p:nvSpPr>
-        <p:spPr>
-          <a:xfrm>
-            <a:off x="9525000" y="2627313"/>
-            <a:ext cx="215900" cy="227013"/>
-          </a:xfrm>
-          <a:prstGeom prst="ellipse">
-            <a:avLst/>
-          </a:prstGeom>
-        </p:spPr>
-        <p:style>
-          <a:lnRef idx="2">
-            <a:schemeClr val="accent1">
-              <a:shade val="50000"/>
-            </a:schemeClr>
-          </a:lnRef>
-          <a:fillRef idx="1">
-            <a:schemeClr val="accent1"/>
-          </a:fillRef>
-          <a:effectRef idx="0">
-            <a:schemeClr val="accent1"/>
-          </a:effectRef>
-          <a:fontRef idx="minor">
-            <a:schemeClr val="lt1"/>
-          </a:fontRef>
-        </p:style>
-        <p:txBody>
-          <a:bodyPr rtlCol="0" anchor="ctr"/>
-          <a:lstStyle/>
-          <a:p>
-            <a:pPr algn="ctr"/>
-            <a:endParaRPr lang="en-US"/>
-          </a:p>
-        </p:txBody>
-      </p:sp>
-      <p:sp>
-        <p:nvSpPr>
-          <p:cNvPr id="52" name="Oval 51">
-            <a:extLst>
-              <a:ext uri="{FF2B5EF4-FFF2-40B4-BE49-F238E27FC236}">
-                <a16:creationId xmlns:a16="http://schemas.microsoft.com/office/drawing/2014/main" id="{1C3CBC0D-A59D-2E4D-9DDC-1419522A4FA9}"/>
-              </a:ext>
-            </a:extLst>
-          </p:cNvPr>
-          <p:cNvSpPr/>
-          <p:nvPr/>
-        </p:nvSpPr>
-        <p:spPr>
-          <a:xfrm>
-            <a:off x="9525000" y="3389313"/>
-            <a:ext cx="215900" cy="227013"/>
-          </a:xfrm>
-          <a:prstGeom prst="ellipse">
-            <a:avLst/>
-          </a:prstGeom>
-        </p:spPr>
-        <p:style>
-          <a:lnRef idx="2">
-            <a:schemeClr val="accent1">
-              <a:shade val="50000"/>
-            </a:schemeClr>
-          </a:lnRef>
-          <a:fillRef idx="1">
-            <a:schemeClr val="accent1"/>
-          </a:fillRef>
-          <a:effectRef idx="0">
-            <a:schemeClr val="accent1"/>
-          </a:effectRef>
-          <a:fontRef idx="minor">
-            <a:schemeClr val="lt1"/>
-          </a:fontRef>
-        </p:style>
-        <p:txBody>
-          <a:bodyPr rtlCol="0" anchor="ctr"/>
-          <a:lstStyle/>
-          <a:p>
-            <a:pPr algn="ctr"/>
-            <a:endParaRPr lang="en-US"/>
-          </a:p>
-        </p:txBody>
-      </p:sp>
-      <p:sp>
-        <p:nvSpPr>
-          <p:cNvPr id="53" name="Oval 52">
-            <a:extLst>
-              <a:ext uri="{FF2B5EF4-FFF2-40B4-BE49-F238E27FC236}">
-                <a16:creationId xmlns:a16="http://schemas.microsoft.com/office/drawing/2014/main" id="{83CC8111-6C46-E84B-AAF2-A4D16A4FA2EE}"/>
-              </a:ext>
-            </a:extLst>
-          </p:cNvPr>
-          <p:cNvSpPr/>
-          <p:nvPr/>
-        </p:nvSpPr>
-        <p:spPr>
-          <a:xfrm>
-            <a:off x="9525000" y="3020218"/>
-            <a:ext cx="215900" cy="227013"/>
-          </a:xfrm>
-          <a:prstGeom prst="ellipse">
-            <a:avLst/>
-          </a:prstGeom>
-        </p:spPr>
-        <p:style>
-          <a:lnRef idx="2">
-            <a:schemeClr val="accent1">
-              <a:shade val="50000"/>
-            </a:schemeClr>
-          </a:lnRef>
-          <a:fillRef idx="1">
-            <a:schemeClr val="accent1"/>
-          </a:fillRef>
-          <a:effectRef idx="0">
-            <a:schemeClr val="accent1"/>
-          </a:effectRef>
-          <a:fontRef idx="minor">
-            <a:schemeClr val="lt1"/>
-          </a:fontRef>
-        </p:style>
-        <p:txBody>
-          <a:bodyPr rtlCol="0" anchor="ctr"/>
-          <a:lstStyle/>
-          <a:p>
-            <a:pPr algn="ctr"/>
-            <a:endParaRPr lang="en-US"/>
-          </a:p>
-        </p:txBody>
-      </p:sp>
-      <p:sp>
-        <p:nvSpPr>
-          <p:cNvPr id="54" name="Oval 53">
-            <a:extLst>
-              <a:ext uri="{FF2B5EF4-FFF2-40B4-BE49-F238E27FC236}">
-                <a16:creationId xmlns:a16="http://schemas.microsoft.com/office/drawing/2014/main" id="{693991AA-4657-DD42-8EBD-D08C53FD3346}"/>
-              </a:ext>
-            </a:extLst>
-          </p:cNvPr>
-          <p:cNvSpPr/>
-          <p:nvPr/>
-        </p:nvSpPr>
-        <p:spPr>
-          <a:xfrm>
-            <a:off x="9525000" y="3734332"/>
-            <a:ext cx="215900" cy="227013"/>
-          </a:xfrm>
-          <a:prstGeom prst="ellipse">
-            <a:avLst/>
-          </a:prstGeom>
-        </p:spPr>
-        <p:style>
-          <a:lnRef idx="2">
-            <a:schemeClr val="accent1">
-              <a:shade val="50000"/>
-            </a:schemeClr>
-          </a:lnRef>
-          <a:fillRef idx="1">
-            <a:schemeClr val="accent1"/>
-          </a:fillRef>
-          <a:effectRef idx="0">
-            <a:schemeClr val="accent1"/>
-          </a:effectRef>
-          <a:fontRef idx="minor">
-            <a:schemeClr val="lt1"/>
-          </a:fontRef>
-        </p:style>
-        <p:txBody>
-          <a:bodyPr rtlCol="0" anchor="ctr"/>
-          <a:lstStyle/>
-          <a:p>
-            <a:pPr algn="ctr"/>
-            <a:endParaRPr lang="en-US"/>
-          </a:p>
-        </p:txBody>
-      </p:sp>
-      <p:sp>
-        <p:nvSpPr>
-          <p:cNvPr id="55" name="Oval 54">
-            <a:extLst>
-              <a:ext uri="{FF2B5EF4-FFF2-40B4-BE49-F238E27FC236}">
-                <a16:creationId xmlns:a16="http://schemas.microsoft.com/office/drawing/2014/main" id="{5C2F06E7-8354-794D-8BDA-4A1CA91B4176}"/>
-              </a:ext>
-            </a:extLst>
-          </p:cNvPr>
-          <p:cNvSpPr/>
-          <p:nvPr/>
-        </p:nvSpPr>
-        <p:spPr>
-          <a:xfrm>
-            <a:off x="9850644" y="2372519"/>
-            <a:ext cx="215900" cy="227013"/>
-          </a:xfrm>
-          <a:prstGeom prst="ellipse">
-            <a:avLst/>
-          </a:prstGeom>
-        </p:spPr>
-        <p:style>
-          <a:lnRef idx="2">
-            <a:schemeClr val="accent1">
-              <a:shade val="50000"/>
-            </a:schemeClr>
-          </a:lnRef>
-          <a:fillRef idx="1">
-            <a:schemeClr val="accent1"/>
-          </a:fillRef>
-          <a:effectRef idx="0">
-            <a:schemeClr val="accent1"/>
-          </a:effectRef>
-          <a:fontRef idx="minor">
-            <a:schemeClr val="lt1"/>
-          </a:fontRef>
-        </p:style>
-        <p:txBody>
-          <a:bodyPr rtlCol="0" anchor="ctr"/>
-          <a:lstStyle/>
-          <a:p>
-            <a:pPr algn="ctr"/>
-            <a:endParaRPr lang="en-US"/>
-          </a:p>
-        </p:txBody>
-      </p:sp>
-      <p:sp>
-        <p:nvSpPr>
-          <p:cNvPr id="56" name="Oval 55">
-            <a:extLst>
-              <a:ext uri="{FF2B5EF4-FFF2-40B4-BE49-F238E27FC236}">
-                <a16:creationId xmlns:a16="http://schemas.microsoft.com/office/drawing/2014/main" id="{DC4AD52F-DF4D-C347-B332-AC42A5B9021F}"/>
-              </a:ext>
-            </a:extLst>
-          </p:cNvPr>
-          <p:cNvSpPr/>
-          <p:nvPr/>
-        </p:nvSpPr>
-        <p:spPr>
-          <a:xfrm>
-            <a:off x="9850644" y="2754313"/>
-            <a:ext cx="215900" cy="227013"/>
-          </a:xfrm>
-          <a:prstGeom prst="ellipse">
-            <a:avLst/>
-          </a:prstGeom>
-        </p:spPr>
-        <p:style>
-          <a:lnRef idx="2">
-            <a:schemeClr val="accent1">
-              <a:shade val="50000"/>
-            </a:schemeClr>
-          </a:lnRef>
-          <a:fillRef idx="1">
-            <a:schemeClr val="accent1"/>
-          </a:fillRef>
-          <a:effectRef idx="0">
-            <a:schemeClr val="accent1"/>
-          </a:effectRef>
-          <a:fontRef idx="minor">
-            <a:schemeClr val="lt1"/>
-          </a:fontRef>
-        </p:style>
-        <p:txBody>
-          <a:bodyPr rtlCol="0" anchor="ctr"/>
-          <a:lstStyle/>
-          <a:p>
-            <a:pPr algn="ctr"/>
-            <a:endParaRPr lang="en-US"/>
-          </a:p>
-        </p:txBody>
-      </p:sp>
-      <p:sp>
-        <p:nvSpPr>
-          <p:cNvPr id="57" name="Oval 56">
-            <a:extLst>
-              <a:ext uri="{FF2B5EF4-FFF2-40B4-BE49-F238E27FC236}">
-                <a16:creationId xmlns:a16="http://schemas.microsoft.com/office/drawing/2014/main" id="{1B011D59-7CDF-A34F-B97B-DC1B41CF0E5F}"/>
-              </a:ext>
-            </a:extLst>
-          </p:cNvPr>
-          <p:cNvSpPr/>
-          <p:nvPr/>
-        </p:nvSpPr>
-        <p:spPr>
-          <a:xfrm>
-            <a:off x="9868573" y="3207543"/>
-            <a:ext cx="215900" cy="227013"/>
-          </a:xfrm>
-          <a:prstGeom prst="ellipse">
-            <a:avLst/>
-          </a:prstGeom>
-        </p:spPr>
-        <p:style>
-          <a:lnRef idx="2">
-            <a:schemeClr val="accent1">
-              <a:shade val="50000"/>
-            </a:schemeClr>
-          </a:lnRef>
-          <a:fillRef idx="1">
-            <a:schemeClr val="accent1"/>
-          </a:fillRef>
-          <a:effectRef idx="0">
-            <a:schemeClr val="accent1"/>
-          </a:effectRef>
-          <a:fontRef idx="minor">
-            <a:schemeClr val="lt1"/>
-          </a:fontRef>
-        </p:style>
-        <p:txBody>
-          <a:bodyPr rtlCol="0" anchor="ctr"/>
-          <a:lstStyle/>
-          <a:p>
-            <a:pPr algn="ctr"/>
-            <a:endParaRPr lang="en-US"/>
-          </a:p>
-        </p:txBody>
-      </p:sp>
-      <p:sp>
-        <p:nvSpPr>
-          <p:cNvPr id="58" name="Oval 57">
-            <a:extLst>
-              <a:ext uri="{FF2B5EF4-FFF2-40B4-BE49-F238E27FC236}">
-                <a16:creationId xmlns:a16="http://schemas.microsoft.com/office/drawing/2014/main" id="{1583CE70-A0E1-0545-A423-E6E59AFC7123}"/>
-              </a:ext>
-            </a:extLst>
-          </p:cNvPr>
-          <p:cNvSpPr/>
-          <p:nvPr/>
-        </p:nvSpPr>
-        <p:spPr>
-          <a:xfrm>
-            <a:off x="9850644" y="4000500"/>
-            <a:ext cx="215900" cy="227013"/>
-          </a:xfrm>
-          <a:prstGeom prst="ellipse">
-            <a:avLst/>
-          </a:prstGeom>
-        </p:spPr>
-        <p:style>
-          <a:lnRef idx="2">
-            <a:schemeClr val="accent1">
-              <a:shade val="50000"/>
-            </a:schemeClr>
-          </a:lnRef>
-          <a:fillRef idx="1">
-            <a:schemeClr val="accent1"/>
-          </a:fillRef>
-          <a:effectRef idx="0">
-            <a:schemeClr val="accent1"/>
-          </a:effectRef>
-          <a:fontRef idx="minor">
-            <a:schemeClr val="lt1"/>
-          </a:fontRef>
-        </p:style>
-        <p:txBody>
-          <a:bodyPr rtlCol="0" anchor="ctr"/>
-          <a:lstStyle/>
-          <a:p>
-            <a:pPr algn="ctr"/>
-            <a:endParaRPr lang="en-US"/>
-          </a:p>
-        </p:txBody>
-      </p:sp>
-      <p:sp>
-        <p:nvSpPr>
-          <p:cNvPr id="59" name="Oval 58">
-            <a:extLst>
-              <a:ext uri="{FF2B5EF4-FFF2-40B4-BE49-F238E27FC236}">
-                <a16:creationId xmlns:a16="http://schemas.microsoft.com/office/drawing/2014/main" id="{D59A5D77-FD91-2C49-85B8-AA26A8DEE3D8}"/>
-              </a:ext>
-            </a:extLst>
-          </p:cNvPr>
-          <p:cNvSpPr/>
-          <p:nvPr/>
-        </p:nvSpPr>
-        <p:spPr>
-          <a:xfrm>
-            <a:off x="9848850" y="3609450"/>
-            <a:ext cx="215900" cy="227013"/>
-          </a:xfrm>
-          <a:prstGeom prst="ellipse">
-            <a:avLst/>
-          </a:prstGeom>
-        </p:spPr>
-        <p:style>
-          <a:lnRef idx="2">
-            <a:schemeClr val="accent1">
-              <a:shade val="50000"/>
-            </a:schemeClr>
-          </a:lnRef>
-          <a:fillRef idx="1">
-            <a:schemeClr val="accent1"/>
-          </a:fillRef>
-          <a:effectRef idx="0">
-            <a:schemeClr val="accent1"/>
-          </a:effectRef>
-          <a:fontRef idx="minor">
-            <a:schemeClr val="lt1"/>
-          </a:fontRef>
-        </p:style>
-        <p:txBody>
-          <a:bodyPr rtlCol="0" anchor="ctr"/>
-          <a:lstStyle/>
-          <a:p>
-            <a:pPr algn="ctr"/>
-            <a:endParaRPr lang="en-US"/>
-          </a:p>
-        </p:txBody>
-      </p:sp>
-      <p:cxnSp>
-        <p:nvCxnSpPr>
-          <p:cNvPr id="69" name="Straight Connector 68">
-            <a:extLst>
-              <a:ext uri="{FF2B5EF4-FFF2-40B4-BE49-F238E27FC236}">
-                <a16:creationId xmlns:a16="http://schemas.microsoft.com/office/drawing/2014/main" id="{06FDD8C9-566D-104A-B681-9608EA9E4C07}"/>
-              </a:ext>
-            </a:extLst>
-          </p:cNvPr>
-          <p:cNvCxnSpPr>
-            <a:cxnSpLocks/>
-          </p:cNvCxnSpPr>
-          <p:nvPr/>
-        </p:nvCxnSpPr>
-        <p:spPr>
-          <a:xfrm>
-            <a:off x="9861682" y="4080500"/>
-            <a:ext cx="172980" cy="105645"/>
-          </a:xfrm>
-          <a:prstGeom prst="line">
-            <a:avLst/>
-          </a:prstGeom>
-        </p:spPr>
-        <p:style>
-          <a:lnRef idx="1">
-            <a:schemeClr val="accent1"/>
-          </a:lnRef>
-          <a:fillRef idx="0">
-            <a:schemeClr val="accent1"/>
-          </a:fillRef>
-          <a:effectRef idx="0">
-            <a:schemeClr val="accent1"/>
-          </a:effectRef>
-          <a:fontRef idx="minor">
-            <a:schemeClr val="tx1"/>
-          </a:fontRef>
-        </p:style>
-      </p:cxnSp>
-      <p:cxnSp>
-        <p:nvCxnSpPr>
-          <p:cNvPr id="72" name="Straight Connector 71">
-            <a:extLst>
-              <a:ext uri="{FF2B5EF4-FFF2-40B4-BE49-F238E27FC236}">
-                <a16:creationId xmlns:a16="http://schemas.microsoft.com/office/drawing/2014/main" id="{E7EA9021-198C-0146-9BA1-E830F1A87F5E}"/>
-              </a:ext>
-            </a:extLst>
-          </p:cNvPr>
-          <p:cNvCxnSpPr>
-            <a:cxnSpLocks/>
-          </p:cNvCxnSpPr>
-          <p:nvPr/>
-        </p:nvCxnSpPr>
-        <p:spPr>
-          <a:xfrm flipV="1">
-            <a:off x="9721982" y="2565578"/>
-            <a:ext cx="139568" cy="120380"/>
-          </a:xfrm>
-          <a:prstGeom prst="line">
-            <a:avLst/>
-          </a:prstGeom>
-        </p:spPr>
-        <p:style>
-          <a:lnRef idx="1">
-            <a:schemeClr val="accent1"/>
-          </a:lnRef>
-          <a:fillRef idx="0">
-            <a:schemeClr val="accent1"/>
-          </a:fillRef>
-          <a:effectRef idx="0">
-            <a:schemeClr val="accent1"/>
-          </a:effectRef>
-          <a:fontRef idx="minor">
-            <a:schemeClr val="tx1"/>
-          </a:fontRef>
-        </p:style>
-      </p:cxnSp>
-      <p:cxnSp>
-        <p:nvCxnSpPr>
-          <p:cNvPr id="75" name="Straight Connector 74">
-            <a:extLst>
-              <a:ext uri="{FF2B5EF4-FFF2-40B4-BE49-F238E27FC236}">
-                <a16:creationId xmlns:a16="http://schemas.microsoft.com/office/drawing/2014/main" id="{4960F4F2-D5B2-2C42-932E-41856ED756E6}"/>
-              </a:ext>
-            </a:extLst>
-          </p:cNvPr>
-          <p:cNvCxnSpPr>
-            <a:cxnSpLocks/>
-          </p:cNvCxnSpPr>
-          <p:nvPr/>
-        </p:nvCxnSpPr>
-        <p:spPr>
-          <a:xfrm flipV="1">
-            <a:off x="9721982" y="2946578"/>
-            <a:ext cx="139568" cy="120380"/>
-          </a:xfrm>
-          <a:prstGeom prst="line">
-            <a:avLst/>
-          </a:prstGeom>
-        </p:spPr>
-        <p:style>
-          <a:lnRef idx="1">
-            <a:schemeClr val="accent1"/>
-          </a:lnRef>
-          <a:fillRef idx="0">
-            <a:schemeClr val="accent1"/>
-          </a:fillRef>
-          <a:effectRef idx="0">
-            <a:schemeClr val="accent1"/>
-          </a:effectRef>
-          <a:fontRef idx="minor">
-            <a:schemeClr val="tx1"/>
-          </a:fontRef>
-        </p:style>
-      </p:cxnSp>
-      <p:cxnSp>
-        <p:nvCxnSpPr>
-          <p:cNvPr id="76" name="Straight Connector 75">
-            <a:extLst>
-              <a:ext uri="{FF2B5EF4-FFF2-40B4-BE49-F238E27FC236}">
-                <a16:creationId xmlns:a16="http://schemas.microsoft.com/office/drawing/2014/main" id="{9052241D-5163-D649-8A3C-9A9DDE09C74B}"/>
-              </a:ext>
-            </a:extLst>
-          </p:cNvPr>
-          <p:cNvCxnSpPr>
-            <a:cxnSpLocks/>
-          </p:cNvCxnSpPr>
-          <p:nvPr/>
-        </p:nvCxnSpPr>
-        <p:spPr>
-          <a:xfrm flipV="1">
-            <a:off x="9696582" y="3371850"/>
-            <a:ext cx="159291" cy="101508"/>
-          </a:xfrm>
-          <a:prstGeom prst="line">
-            <a:avLst/>
-          </a:prstGeom>
-        </p:spPr>
-        <p:style>
-          <a:lnRef idx="1">
-            <a:schemeClr val="accent1"/>
-          </a:lnRef>
-          <a:fillRef idx="0">
-            <a:schemeClr val="accent1"/>
-          </a:fillRef>
-          <a:effectRef idx="0">
-            <a:schemeClr val="accent1"/>
-          </a:effectRef>
-          <a:fontRef idx="minor">
-            <a:schemeClr val="tx1"/>
-          </a:fontRef>
-        </p:style>
-      </p:cxnSp>
-      <p:cxnSp>
-        <p:nvCxnSpPr>
-          <p:cNvPr id="80" name="Straight Connector 79">
-            <a:extLst>
-              <a:ext uri="{FF2B5EF4-FFF2-40B4-BE49-F238E27FC236}">
-                <a16:creationId xmlns:a16="http://schemas.microsoft.com/office/drawing/2014/main" id="{5FDB3BBE-A8BF-FC42-B205-E8455971B943}"/>
-              </a:ext>
-            </a:extLst>
-          </p:cNvPr>
-          <p:cNvCxnSpPr>
-            <a:cxnSpLocks/>
-            <a:stCxn id="59" idx="6"/>
-            <a:endCxn id="54" idx="3"/>
-          </p:cNvCxnSpPr>
-          <p:nvPr/>
-        </p:nvCxnSpPr>
-        <p:spPr>
-          <a:xfrm flipH="1">
-            <a:off x="9556618" y="3722957"/>
-            <a:ext cx="508132" cy="205143"/>
-          </a:xfrm>
-          <a:prstGeom prst="line">
-            <a:avLst/>
-          </a:prstGeom>
-        </p:spPr>
-        <p:style>
-          <a:lnRef idx="1">
-            <a:schemeClr val="accent1"/>
-          </a:lnRef>
-          <a:fillRef idx="0">
-            <a:schemeClr val="accent1"/>
-          </a:fillRef>
-          <a:effectRef idx="0">
-            <a:schemeClr val="accent1"/>
-          </a:effectRef>
-          <a:fontRef idx="minor">
-            <a:schemeClr val="tx1"/>
-          </a:fontRef>
-        </p:style>
-      </p:cxnSp>
-      <p:cxnSp>
-        <p:nvCxnSpPr>
-          <p:cNvPr id="85" name="Straight Connector 84">
-            <a:extLst>
-              <a:ext uri="{FF2B5EF4-FFF2-40B4-BE49-F238E27FC236}">
-                <a16:creationId xmlns:a16="http://schemas.microsoft.com/office/drawing/2014/main" id="{C6B59015-75E9-144B-8106-F56672F68213}"/>
-              </a:ext>
-            </a:extLst>
-          </p:cNvPr>
-          <p:cNvCxnSpPr>
-            <a:cxnSpLocks/>
-            <a:stCxn id="58" idx="6"/>
-          </p:cNvCxnSpPr>
-          <p:nvPr/>
-        </p:nvCxnSpPr>
-        <p:spPr>
-          <a:xfrm flipH="1" flipV="1">
-            <a:off x="9683750" y="3892111"/>
-            <a:ext cx="382794" cy="221896"/>
-          </a:xfrm>
-          <a:prstGeom prst="line">
-            <a:avLst/>
-          </a:prstGeom>
-        </p:spPr>
-        <p:style>
-          <a:lnRef idx="1">
-            <a:schemeClr val="accent1"/>
-          </a:lnRef>
-          <a:fillRef idx="0">
-            <a:schemeClr val="accent1"/>
-          </a:fillRef>
-          <a:effectRef idx="0">
-            <a:schemeClr val="accent1"/>
-          </a:effectRef>
-          <a:fontRef idx="minor">
-            <a:schemeClr val="tx1"/>
-          </a:fontRef>
-        </p:style>
-      </p:cxnSp>
-      <p:cxnSp>
-        <p:nvCxnSpPr>
-          <p:cNvPr id="88" name="Straight Connector 87">
-            <a:extLst>
-              <a:ext uri="{FF2B5EF4-FFF2-40B4-BE49-F238E27FC236}">
-                <a16:creationId xmlns:a16="http://schemas.microsoft.com/office/drawing/2014/main" id="{0EA42A46-1DD9-7C44-A4C3-D4208F713B17}"/>
-              </a:ext>
-            </a:extLst>
-          </p:cNvPr>
-          <p:cNvCxnSpPr>
-            <a:cxnSpLocks/>
-            <a:stCxn id="53" idx="7"/>
-            <a:endCxn id="55" idx="3"/>
-          </p:cNvCxnSpPr>
-          <p:nvPr/>
-        </p:nvCxnSpPr>
-        <p:spPr>
-          <a:xfrm flipV="1">
-            <a:off x="9709282" y="2566287"/>
-            <a:ext cx="172980" cy="487176"/>
-          </a:xfrm>
-          <a:prstGeom prst="line">
-            <a:avLst/>
-          </a:prstGeom>
-        </p:spPr>
-        <p:style>
-          <a:lnRef idx="1">
-            <a:schemeClr val="accent1"/>
-          </a:lnRef>
-          <a:fillRef idx="0">
-            <a:schemeClr val="accent1"/>
-          </a:fillRef>
-          <a:effectRef idx="0">
-            <a:schemeClr val="accent1"/>
-          </a:effectRef>
-          <a:fontRef idx="minor">
-            <a:schemeClr val="tx1"/>
-          </a:fontRef>
-        </p:style>
-      </p:cxnSp>
-      <p:cxnSp>
-        <p:nvCxnSpPr>
-          <p:cNvPr id="91" name="Straight Connector 90">
-            <a:extLst>
-              <a:ext uri="{FF2B5EF4-FFF2-40B4-BE49-F238E27FC236}">
-                <a16:creationId xmlns:a16="http://schemas.microsoft.com/office/drawing/2014/main" id="{7536988B-5889-7E40-ACE3-9531456F7ACF}"/>
-              </a:ext>
-            </a:extLst>
-          </p:cNvPr>
-          <p:cNvCxnSpPr>
-            <a:cxnSpLocks/>
-            <a:stCxn id="52" idx="7"/>
-            <a:endCxn id="58" idx="1"/>
-          </p:cNvCxnSpPr>
-          <p:nvPr/>
-        </p:nvCxnSpPr>
-        <p:spPr>
-          <a:xfrm>
-            <a:off x="9709282" y="3422558"/>
-            <a:ext cx="172980" cy="611187"/>
-          </a:xfrm>
-          <a:prstGeom prst="line">
-            <a:avLst/>
-          </a:prstGeom>
-        </p:spPr>
-        <p:style>
-          <a:lnRef idx="1">
-            <a:schemeClr val="accent1"/>
-          </a:lnRef>
-          <a:fillRef idx="0">
-            <a:schemeClr val="accent1"/>
-          </a:fillRef>
-          <a:effectRef idx="0">
-            <a:schemeClr val="accent1"/>
-          </a:effectRef>
-          <a:fontRef idx="minor">
-            <a:schemeClr val="tx1"/>
-          </a:fontRef>
-        </p:style>
-      </p:cxnSp>
-      <p:cxnSp>
-        <p:nvCxnSpPr>
-          <p:cNvPr id="94" name="Straight Connector 93">
-            <a:extLst>
-              <a:ext uri="{FF2B5EF4-FFF2-40B4-BE49-F238E27FC236}">
-                <a16:creationId xmlns:a16="http://schemas.microsoft.com/office/drawing/2014/main" id="{48B55576-C018-4F42-92F7-46A46C8E9186}"/>
-              </a:ext>
-            </a:extLst>
-          </p:cNvPr>
-          <p:cNvCxnSpPr>
-            <a:cxnSpLocks/>
-            <a:stCxn id="52" idx="6"/>
-            <a:endCxn id="59" idx="5"/>
-          </p:cNvCxnSpPr>
-          <p:nvPr/>
-        </p:nvCxnSpPr>
-        <p:spPr>
-          <a:xfrm>
-            <a:off x="9740900" y="3502820"/>
-            <a:ext cx="292232" cy="300398"/>
-          </a:xfrm>
-          <a:prstGeom prst="line">
-            <a:avLst/>
-          </a:prstGeom>
-        </p:spPr>
-        <p:style>
-          <a:lnRef idx="1">
-            <a:schemeClr val="accent1"/>
-          </a:lnRef>
-          <a:fillRef idx="0">
-            <a:schemeClr val="accent1"/>
-          </a:fillRef>
-          <a:effectRef idx="0">
-            <a:schemeClr val="accent1"/>
-          </a:effectRef>
-          <a:fontRef idx="minor">
-            <a:schemeClr val="tx1"/>
-          </a:fontRef>
-        </p:style>
-      </p:cxnSp>
-      <p:cxnSp>
-        <p:nvCxnSpPr>
-          <p:cNvPr id="98" name="Straight Connector 97">
-            <a:extLst>
-              <a:ext uri="{FF2B5EF4-FFF2-40B4-BE49-F238E27FC236}">
-                <a16:creationId xmlns:a16="http://schemas.microsoft.com/office/drawing/2014/main" id="{71789F31-BC72-7D4F-8477-89ED6A5D0709}"/>
-              </a:ext>
-            </a:extLst>
-          </p:cNvPr>
-          <p:cNvCxnSpPr>
-            <a:cxnSpLocks/>
-            <a:stCxn id="52" idx="6"/>
-            <a:endCxn id="56" idx="3"/>
-          </p:cNvCxnSpPr>
-          <p:nvPr/>
-        </p:nvCxnSpPr>
-        <p:spPr>
-          <a:xfrm flipV="1">
-            <a:off x="9740900" y="2948081"/>
-            <a:ext cx="141362" cy="554739"/>
-          </a:xfrm>
-          <a:prstGeom prst="line">
-            <a:avLst/>
-          </a:prstGeom>
-        </p:spPr>
-        <p:style>
-          <a:lnRef idx="1">
-            <a:schemeClr val="accent1"/>
-          </a:lnRef>
-          <a:fillRef idx="0">
-            <a:schemeClr val="accent1"/>
-          </a:fillRef>
-          <a:effectRef idx="0">
-            <a:schemeClr val="accent1"/>
-          </a:effectRef>
-          <a:fontRef idx="minor">
-            <a:schemeClr val="tx1"/>
-          </a:fontRef>
-        </p:style>
-      </p:cxnSp>
-      <p:cxnSp>
-        <p:nvCxnSpPr>
-          <p:cNvPr id="104" name="Curved Connector 103">
-            <a:extLst>
-              <a:ext uri="{FF2B5EF4-FFF2-40B4-BE49-F238E27FC236}">
-                <a16:creationId xmlns:a16="http://schemas.microsoft.com/office/drawing/2014/main" id="{33201DC4-2EBE-8A48-BFD2-29D22C48A129}"/>
-              </a:ext>
-            </a:extLst>
-          </p:cNvPr>
-          <p:cNvCxnSpPr>
-            <a:stCxn id="55" idx="6"/>
-          </p:cNvCxnSpPr>
-          <p:nvPr/>
-        </p:nvCxnSpPr>
-        <p:spPr>
-          <a:xfrm flipH="1" flipV="1">
-            <a:off x="9976523" y="2358889"/>
-            <a:ext cx="90021" cy="127137"/>
-          </a:xfrm>
-          <a:prstGeom prst="curvedConnector4">
-            <a:avLst>
-              <a:gd name="adj1" fmla="val -225725"/>
-              <a:gd name="adj2" fmla="val 284435"/>
-            </a:avLst>
-          </a:prstGeom>
-          <a:ln>
-            <a:tailEnd type="triangle"/>
-          </a:ln>
-        </p:spPr>
-        <p:style>
-          <a:lnRef idx="1">
-            <a:schemeClr val="accent1"/>
-          </a:lnRef>
-          <a:fillRef idx="0">
-            <a:schemeClr val="accent1"/>
-          </a:fillRef>
-          <a:effectRef idx="0">
-            <a:schemeClr val="accent1"/>
-          </a:effectRef>
-          <a:fontRef idx="minor">
-            <a:schemeClr val="tx1"/>
-          </a:fontRef>
-        </p:style>
-      </p:cxnSp>
-      <p:cxnSp>
-        <p:nvCxnSpPr>
-          <p:cNvPr id="115" name="Curved Connector 114">
-            <a:extLst>
-              <a:ext uri="{FF2B5EF4-FFF2-40B4-BE49-F238E27FC236}">
-                <a16:creationId xmlns:a16="http://schemas.microsoft.com/office/drawing/2014/main" id="{F5E6F061-5E2C-7E42-9FF1-C58211F1DC6B}"/>
-              </a:ext>
-            </a:extLst>
-          </p:cNvPr>
-          <p:cNvCxnSpPr/>
-          <p:nvPr/>
-        </p:nvCxnSpPr>
-        <p:spPr>
-          <a:xfrm flipH="1" flipV="1">
-            <a:off x="9976523" y="2764741"/>
-            <a:ext cx="90021" cy="127137"/>
-          </a:xfrm>
-          <a:prstGeom prst="curvedConnector4">
-            <a:avLst>
-              <a:gd name="adj1" fmla="val -225725"/>
-              <a:gd name="adj2" fmla="val 224500"/>
-            </a:avLst>
-          </a:prstGeom>
-          <a:ln>
-            <a:tailEnd type="triangle"/>
-          </a:ln>
-        </p:spPr>
-        <p:style>
-          <a:lnRef idx="1">
-            <a:schemeClr val="accent1"/>
-          </a:lnRef>
-          <a:fillRef idx="0">
-            <a:schemeClr val="accent1"/>
-          </a:fillRef>
-          <a:effectRef idx="0">
-            <a:schemeClr val="accent1"/>
-          </a:effectRef>
-          <a:fontRef idx="minor">
-            <a:schemeClr val="tx1"/>
-          </a:fontRef>
-        </p:style>
-      </p:cxnSp>
-      <p:cxnSp>
-        <p:nvCxnSpPr>
-          <p:cNvPr id="117" name="Curved Connector 116">
-            <a:extLst>
-              <a:ext uri="{FF2B5EF4-FFF2-40B4-BE49-F238E27FC236}">
-                <a16:creationId xmlns:a16="http://schemas.microsoft.com/office/drawing/2014/main" id="{FB232518-1F16-414A-8F51-B71C786BB3E4}"/>
-              </a:ext>
-            </a:extLst>
-          </p:cNvPr>
-          <p:cNvCxnSpPr/>
-          <p:nvPr/>
-        </p:nvCxnSpPr>
-        <p:spPr>
-          <a:xfrm flipH="1" flipV="1">
-            <a:off x="9997831" y="3207791"/>
-            <a:ext cx="90021" cy="127137"/>
-          </a:xfrm>
-          <a:prstGeom prst="curvedConnector4">
-            <a:avLst>
-              <a:gd name="adj1" fmla="val -211617"/>
-              <a:gd name="adj2" fmla="val 224500"/>
-            </a:avLst>
-          </a:prstGeom>
-          <a:ln>
-            <a:tailEnd type="triangle"/>
-          </a:ln>
-        </p:spPr>
-        <p:style>
-          <a:lnRef idx="1">
-            <a:schemeClr val="accent1"/>
-          </a:lnRef>
-          <a:fillRef idx="0">
-            <a:schemeClr val="accent1"/>
-          </a:fillRef>
-          <a:effectRef idx="0">
-            <a:schemeClr val="accent1"/>
-          </a:effectRef>
-          <a:fontRef idx="minor">
-            <a:schemeClr val="tx1"/>
-          </a:fontRef>
-        </p:style>
-      </p:cxnSp>
-      <p:cxnSp>
-        <p:nvCxnSpPr>
-          <p:cNvPr id="119" name="Curved Connector 118">
-            <a:extLst>
-              <a:ext uri="{FF2B5EF4-FFF2-40B4-BE49-F238E27FC236}">
-                <a16:creationId xmlns:a16="http://schemas.microsoft.com/office/drawing/2014/main" id="{0F9CF66F-A9D9-714E-8749-661FCE4FBCF2}"/>
-              </a:ext>
-            </a:extLst>
-          </p:cNvPr>
-          <p:cNvCxnSpPr/>
-          <p:nvPr/>
-        </p:nvCxnSpPr>
-        <p:spPr>
-          <a:xfrm flipH="1" flipV="1">
-            <a:off x="10013390" y="3614804"/>
-            <a:ext cx="90021" cy="127137"/>
-          </a:xfrm>
-          <a:prstGeom prst="curvedConnector4">
-            <a:avLst>
-              <a:gd name="adj1" fmla="val -183402"/>
-              <a:gd name="adj2" fmla="val 224500"/>
-            </a:avLst>
-          </a:prstGeom>
-          <a:ln>
-            <a:tailEnd type="triangle"/>
-          </a:ln>
-        </p:spPr>
-        <p:style>
-          <a:lnRef idx="1">
-            <a:schemeClr val="accent1"/>
-          </a:lnRef>
-          <a:fillRef idx="0">
-            <a:schemeClr val="accent1"/>
-          </a:fillRef>
-          <a:effectRef idx="0">
-            <a:schemeClr val="accent1"/>
-          </a:effectRef>
-          <a:fontRef idx="minor">
-            <a:schemeClr val="tx1"/>
-          </a:fontRef>
-        </p:style>
-      </p:cxnSp>
-      <p:cxnSp>
-        <p:nvCxnSpPr>
-          <p:cNvPr id="122" name="Curved Connector 121">
-            <a:extLst>
-              <a:ext uri="{FF2B5EF4-FFF2-40B4-BE49-F238E27FC236}">
-                <a16:creationId xmlns:a16="http://schemas.microsoft.com/office/drawing/2014/main" id="{952D76A5-5F80-E244-A8B3-F9EF9E6F473F}"/>
-              </a:ext>
-            </a:extLst>
-          </p:cNvPr>
-          <p:cNvCxnSpPr/>
-          <p:nvPr/>
-        </p:nvCxnSpPr>
-        <p:spPr>
-          <a:xfrm flipH="1" flipV="1">
-            <a:off x="10013390" y="4020826"/>
-            <a:ext cx="90021" cy="127137"/>
-          </a:xfrm>
-          <a:prstGeom prst="curvedConnector4">
-            <a:avLst>
-              <a:gd name="adj1" fmla="val -183402"/>
-              <a:gd name="adj2" fmla="val 224500"/>
-            </a:avLst>
-          </a:prstGeom>
-          <a:ln>
-            <a:tailEnd type="triangle"/>
-          </a:ln>
-        </p:spPr>
-        <p:style>
-          <a:lnRef idx="1">
-            <a:schemeClr val="accent1"/>
-          </a:lnRef>
-          <a:fillRef idx="0">
-            <a:schemeClr val="accent1"/>
-          </a:fillRef>
-          <a:effectRef idx="0">
-            <a:schemeClr val="accent1"/>
-          </a:effectRef>
-          <a:fontRef idx="minor">
-            <a:schemeClr val="tx1"/>
-          </a:fontRef>
-        </p:style>
-      </p:cxnSp>
-      <p:sp>
-        <p:nvSpPr>
-          <p:cNvPr id="123" name="TextBox 122">
-            <a:extLst>
-              <a:ext uri="{FF2B5EF4-FFF2-40B4-BE49-F238E27FC236}">
-                <a16:creationId xmlns:a16="http://schemas.microsoft.com/office/drawing/2014/main" id="{EAEF4BA9-108B-9A48-B251-8AC2F751EF08}"/>
-              </a:ext>
-            </a:extLst>
-          </p:cNvPr>
-          <p:cNvSpPr txBox="1"/>
-          <p:nvPr/>
-        </p:nvSpPr>
-        <p:spPr>
-          <a:xfrm>
-            <a:off x="9443011" y="1580138"/>
-            <a:ext cx="1320800" cy="646331"/>
-          </a:xfrm>
-          <a:prstGeom prst="rect">
-            <a:avLst/>
-          </a:prstGeom>
-          <a:noFill/>
-        </p:spPr>
-        <p:txBody>
-          <a:bodyPr wrap="square" rtlCol="0">
-            <a:spAutoFit/>
-          </a:bodyPr>
-          <a:lstStyle/>
-          <a:p>
-            <a:r>
-              <a:rPr lang="en-US" dirty="0" err="1"/>
-              <a:t>Modelo</a:t>
-            </a:r>
-            <a:r>
-              <a:rPr lang="en-US" dirty="0"/>
-              <a:t> </a:t>
-            </a:r>
-            <a:r>
-              <a:rPr lang="en-US" dirty="0" err="1"/>
-              <a:t>treinado</a:t>
+              <a:t>Seleção</a:t>
             </a:r>
             <a:endParaRPr lang="en-US" dirty="0"/>
           </a:p>
         </p:txBody>
       </p:sp>
-      <p:sp>
-        <p:nvSpPr>
-          <p:cNvPr id="124" name="Right Arrow 123">
+      <p:graphicFrame>
+        <p:nvGraphicFramePr>
+          <p:cNvPr id="11" name="Table 10">
             <a:extLst>
               <a:ext uri="{FF2B5EF4-FFF2-40B4-BE49-F238E27FC236}">
-                <a16:creationId xmlns:a16="http://schemas.microsoft.com/office/drawing/2014/main" id="{4B4FE964-1FCB-9644-9627-7F3CDC9A676D}"/>
+                <a16:creationId xmlns:a16="http://schemas.microsoft.com/office/drawing/2014/main" id="{D75529C4-D31B-AF40-89C0-3B25D5BEFF90}"/>
               </a:ext>
             </a:extLst>
           </p:cNvPr>
-          <p:cNvSpPr/>
-          <p:nvPr/>
-        </p:nvSpPr>
-        <p:spPr>
-          <a:xfrm rot="5400000">
-            <a:off x="9420272" y="4438236"/>
-            <a:ext cx="945792" cy="673100"/>
-          </a:xfrm>
-          <a:prstGeom prst="rightArrow">
-            <a:avLst/>
-          </a:prstGeom>
-        </p:spPr>
-        <p:style>
-          <a:lnRef idx="2">
-            <a:schemeClr val="dk1">
-              <a:shade val="50000"/>
-            </a:schemeClr>
-          </a:lnRef>
-          <a:fillRef idx="1">
-            <a:schemeClr val="dk1"/>
-          </a:fillRef>
-          <a:effectRef idx="0">
-            <a:schemeClr val="dk1"/>
-          </a:effectRef>
-          <a:fontRef idx="minor">
-            <a:schemeClr val="lt1"/>
-          </a:fontRef>
-        </p:style>
-        <p:txBody>
-          <a:bodyPr rtlCol="0" anchor="ctr"/>
-          <a:lstStyle/>
-          <a:p>
-            <a:pPr algn="ctr"/>
-            <a:endParaRPr lang="en-US"/>
-          </a:p>
-        </p:txBody>
-      </p:sp>
-      <p:sp>
-        <p:nvSpPr>
-          <p:cNvPr id="126" name="Rectangle 125">
-            <a:extLst>
-              <a:ext uri="{FF2B5EF4-FFF2-40B4-BE49-F238E27FC236}">
-                <a16:creationId xmlns:a16="http://schemas.microsoft.com/office/drawing/2014/main" id="{30C2259E-19E6-A147-BF4D-A4CD0DA00DBF}"/>
-              </a:ext>
-            </a:extLst>
-          </p:cNvPr>
-          <p:cNvSpPr/>
-          <p:nvPr/>
-        </p:nvSpPr>
-        <p:spPr>
-          <a:xfrm>
-            <a:off x="7428827" y="5388045"/>
-            <a:ext cx="622300" cy="736600"/>
-          </a:xfrm>
-          <a:prstGeom prst="rect">
-            <a:avLst/>
-          </a:prstGeom>
-          <a:solidFill>
-            <a:schemeClr val="bg1"/>
-          </a:solidFill>
-          <a:ln w="38100">
-            <a:solidFill>
-              <a:schemeClr val="tx1"/>
-            </a:solidFill>
-          </a:ln>
-        </p:spPr>
-        <p:style>
-          <a:lnRef idx="2">
-            <a:schemeClr val="accent6"/>
-          </a:lnRef>
-          <a:fillRef idx="1">
-            <a:schemeClr val="lt1"/>
-          </a:fillRef>
-          <a:effectRef idx="0">
-            <a:schemeClr val="accent6"/>
-          </a:effectRef>
-          <a:fontRef idx="minor">
-            <a:schemeClr val="dk1"/>
-          </a:fontRef>
-        </p:style>
-        <p:txBody>
-          <a:bodyPr rtlCol="0" anchor="ctr"/>
-          <a:lstStyle/>
-          <a:p>
-            <a:pPr algn="ctr"/>
-            <a:endParaRPr lang="en-US"/>
-          </a:p>
-        </p:txBody>
-      </p:sp>
-      <p:sp>
-        <p:nvSpPr>
-          <p:cNvPr id="127" name="Right Arrow 126">
-            <a:extLst>
-              <a:ext uri="{FF2B5EF4-FFF2-40B4-BE49-F238E27FC236}">
-                <a16:creationId xmlns:a16="http://schemas.microsoft.com/office/drawing/2014/main" id="{27DA6FF6-C8B5-ED44-8040-36338FDD04D6}"/>
-              </a:ext>
-            </a:extLst>
-          </p:cNvPr>
-          <p:cNvSpPr/>
-          <p:nvPr/>
-        </p:nvSpPr>
-        <p:spPr>
-          <a:xfrm>
-            <a:off x="8216900" y="5419795"/>
-            <a:ext cx="989927" cy="673100"/>
-          </a:xfrm>
-          <a:prstGeom prst="rightArrow">
-            <a:avLst/>
-          </a:prstGeom>
-        </p:spPr>
-        <p:style>
-          <a:lnRef idx="2">
-            <a:schemeClr val="dk1">
-              <a:shade val="50000"/>
-            </a:schemeClr>
-          </a:lnRef>
-          <a:fillRef idx="1">
-            <a:schemeClr val="dk1"/>
-          </a:fillRef>
-          <a:effectRef idx="0">
-            <a:schemeClr val="dk1"/>
-          </a:effectRef>
-          <a:fontRef idx="minor">
-            <a:schemeClr val="lt1"/>
-          </a:fontRef>
-        </p:style>
-        <p:txBody>
-          <a:bodyPr rtlCol="0" anchor="ctr"/>
-          <a:lstStyle/>
-          <a:p>
-            <a:pPr algn="ctr"/>
-            <a:endParaRPr lang="en-US"/>
-          </a:p>
-        </p:txBody>
-      </p:sp>
-      <p:sp>
-        <p:nvSpPr>
-          <p:cNvPr id="129" name="Round Diagonal Corner Rectangle 128">
-            <a:extLst>
-              <a:ext uri="{FF2B5EF4-FFF2-40B4-BE49-F238E27FC236}">
-                <a16:creationId xmlns:a16="http://schemas.microsoft.com/office/drawing/2014/main" id="{F75830A5-D9C7-8C45-9AAC-4CCC754B5E54}"/>
-              </a:ext>
-            </a:extLst>
-          </p:cNvPr>
-          <p:cNvSpPr/>
-          <p:nvPr/>
-        </p:nvSpPr>
-        <p:spPr>
-          <a:xfrm>
-            <a:off x="9495547" y="5306957"/>
-            <a:ext cx="621792" cy="740664"/>
-          </a:xfrm>
-          <a:prstGeom prst="round2DiagRect">
-            <a:avLst/>
-          </a:prstGeom>
-        </p:spPr>
-        <p:style>
-          <a:lnRef idx="2">
-            <a:schemeClr val="accent1">
-              <a:shade val="50000"/>
-            </a:schemeClr>
-          </a:lnRef>
-          <a:fillRef idx="1">
-            <a:schemeClr val="accent1"/>
-          </a:fillRef>
-          <a:effectRef idx="0">
-            <a:schemeClr val="accent1"/>
-          </a:effectRef>
-          <a:fontRef idx="minor">
-            <a:schemeClr val="lt1"/>
-          </a:fontRef>
-        </p:style>
-        <p:txBody>
-          <a:bodyPr rtlCol="0" anchor="ctr"/>
-          <a:lstStyle/>
-          <a:p>
-            <a:pPr algn="ctr"/>
-            <a:endParaRPr lang="en-US"/>
-          </a:p>
-        </p:txBody>
-      </p:sp>
-      <p:sp>
-        <p:nvSpPr>
-          <p:cNvPr id="130" name="TextBox 129">
-            <a:extLst>
-              <a:ext uri="{FF2B5EF4-FFF2-40B4-BE49-F238E27FC236}">
-                <a16:creationId xmlns:a16="http://schemas.microsoft.com/office/drawing/2014/main" id="{D37F1BB5-0E3A-5146-9486-1A354DF2A5BA}"/>
-              </a:ext>
-            </a:extLst>
-          </p:cNvPr>
-          <p:cNvSpPr txBox="1"/>
-          <p:nvPr/>
-        </p:nvSpPr>
-        <p:spPr>
-          <a:xfrm>
-            <a:off x="7002942" y="6124645"/>
-            <a:ext cx="1467958" cy="369332"/>
-          </a:xfrm>
-          <a:prstGeom prst="rect">
-            <a:avLst/>
-          </a:prstGeom>
-          <a:noFill/>
-        </p:spPr>
-        <p:txBody>
-          <a:bodyPr wrap="square" rtlCol="0">
-            <a:spAutoFit/>
-          </a:bodyPr>
-          <a:lstStyle/>
-          <a:p>
-            <a:r>
-              <a:rPr lang="en-US" dirty="0" err="1"/>
-              <a:t>Código</a:t>
-            </a:r>
-            <a:r>
-              <a:rPr lang="en-US" dirty="0"/>
-              <a:t> </a:t>
-            </a:r>
-            <a:r>
-              <a:rPr lang="en-US" dirty="0" err="1"/>
-              <a:t>fonte</a:t>
-            </a:r>
-            <a:endParaRPr lang="en-US" dirty="0"/>
-          </a:p>
-        </p:txBody>
-      </p:sp>
-      <p:sp>
-        <p:nvSpPr>
-          <p:cNvPr id="131" name="TextBox 130">
-            <a:extLst>
-              <a:ext uri="{FF2B5EF4-FFF2-40B4-BE49-F238E27FC236}">
-                <a16:creationId xmlns:a16="http://schemas.microsoft.com/office/drawing/2014/main" id="{F9007645-27D2-AA45-8E88-F603A754A72D}"/>
-              </a:ext>
-            </a:extLst>
-          </p:cNvPr>
-          <p:cNvSpPr txBox="1"/>
-          <p:nvPr/>
-        </p:nvSpPr>
-        <p:spPr>
-          <a:xfrm>
-            <a:off x="9342066" y="6118268"/>
-            <a:ext cx="945589" cy="369332"/>
-          </a:xfrm>
-          <a:prstGeom prst="rect">
-            <a:avLst/>
-          </a:prstGeom>
-          <a:noFill/>
-        </p:spPr>
-        <p:txBody>
-          <a:bodyPr wrap="square" rtlCol="0">
-            <a:spAutoFit/>
-          </a:bodyPr>
-          <a:lstStyle/>
-          <a:p>
-            <a:r>
-              <a:rPr lang="en-US" dirty="0"/>
-              <a:t>Sistema</a:t>
-            </a:r>
-          </a:p>
-        </p:txBody>
-      </p:sp>
-      <p:sp>
-        <p:nvSpPr>
-          <p:cNvPr id="133" name="Right Arrow 132">
-            <a:extLst>
-              <a:ext uri="{FF2B5EF4-FFF2-40B4-BE49-F238E27FC236}">
-                <a16:creationId xmlns:a16="http://schemas.microsoft.com/office/drawing/2014/main" id="{3771B6DD-0172-3D48-AA90-65497F9398D7}"/>
-              </a:ext>
-            </a:extLst>
-          </p:cNvPr>
-          <p:cNvSpPr/>
-          <p:nvPr/>
-        </p:nvSpPr>
-        <p:spPr>
-          <a:xfrm>
-            <a:off x="10287655" y="5388045"/>
-            <a:ext cx="788439" cy="673100"/>
-          </a:xfrm>
-          <a:prstGeom prst="rightArrow">
-            <a:avLst/>
-          </a:prstGeom>
-        </p:spPr>
-        <p:style>
-          <a:lnRef idx="2">
-            <a:schemeClr val="dk1">
-              <a:shade val="50000"/>
-            </a:schemeClr>
-          </a:lnRef>
-          <a:fillRef idx="1">
-            <a:schemeClr val="dk1"/>
-          </a:fillRef>
-          <a:effectRef idx="0">
-            <a:schemeClr val="dk1"/>
-          </a:effectRef>
-          <a:fontRef idx="minor">
-            <a:schemeClr val="lt1"/>
-          </a:fontRef>
-        </p:style>
-        <p:txBody>
-          <a:bodyPr rtlCol="0" anchor="ctr"/>
-          <a:lstStyle/>
-          <a:p>
-            <a:pPr algn="ctr"/>
-            <a:endParaRPr lang="en-US"/>
-          </a:p>
-        </p:txBody>
-      </p:sp>
-      <p:sp>
-        <p:nvSpPr>
-          <p:cNvPr id="134" name="Round Diagonal Corner Rectangle 133">
-            <a:extLst>
-              <a:ext uri="{FF2B5EF4-FFF2-40B4-BE49-F238E27FC236}">
-                <a16:creationId xmlns:a16="http://schemas.microsoft.com/office/drawing/2014/main" id="{57DBA128-D0DB-1740-9425-0D42B148BACC}"/>
-              </a:ext>
-            </a:extLst>
-          </p:cNvPr>
-          <p:cNvSpPr/>
-          <p:nvPr/>
-        </p:nvSpPr>
-        <p:spPr>
-          <a:xfrm>
-            <a:off x="11253433" y="5348590"/>
-            <a:ext cx="621792" cy="740664"/>
-          </a:xfrm>
-          <a:prstGeom prst="round2DiagRect">
-            <a:avLst/>
-          </a:prstGeom>
-          <a:noFill/>
-          <a:ln w="38100">
-            <a:solidFill>
-              <a:schemeClr val="tx1"/>
-            </a:solidFill>
-          </a:ln>
-        </p:spPr>
-        <p:style>
-          <a:lnRef idx="2">
-            <a:schemeClr val="accent6"/>
-          </a:lnRef>
-          <a:fillRef idx="1">
-            <a:schemeClr val="lt1"/>
-          </a:fillRef>
-          <a:effectRef idx="0">
-            <a:schemeClr val="accent6"/>
-          </a:effectRef>
-          <a:fontRef idx="minor">
-            <a:schemeClr val="dk1"/>
-          </a:fontRef>
-        </p:style>
-        <p:txBody>
-          <a:bodyPr rtlCol="0" anchor="ctr"/>
-          <a:lstStyle/>
-          <a:p>
-            <a:pPr algn="ctr"/>
-            <a:endParaRPr lang="en-US"/>
-          </a:p>
-        </p:txBody>
-      </p:sp>
-      <p:sp>
-        <p:nvSpPr>
-          <p:cNvPr id="135" name="TextBox 134">
-            <a:extLst>
-              <a:ext uri="{FF2B5EF4-FFF2-40B4-BE49-F238E27FC236}">
-                <a16:creationId xmlns:a16="http://schemas.microsoft.com/office/drawing/2014/main" id="{6CA3544A-7C39-5E4F-AB38-F7251976BF0A}"/>
-              </a:ext>
-            </a:extLst>
-          </p:cNvPr>
-          <p:cNvSpPr txBox="1"/>
-          <p:nvPr/>
-        </p:nvSpPr>
-        <p:spPr>
-          <a:xfrm>
-            <a:off x="11253433" y="5511800"/>
-            <a:ext cx="621791" cy="369332"/>
-          </a:xfrm>
-          <a:prstGeom prst="rect">
-            <a:avLst/>
-          </a:prstGeom>
-          <a:noFill/>
-        </p:spPr>
-        <p:txBody>
-          <a:bodyPr wrap="square" rtlCol="0">
-            <a:spAutoFit/>
-          </a:bodyPr>
-          <a:lstStyle/>
-          <a:p>
-            <a:r>
-              <a:rPr lang="en-US" dirty="0" err="1"/>
-              <a:t>Erro</a:t>
-            </a:r>
-            <a:endParaRPr lang="en-US" dirty="0"/>
-          </a:p>
-        </p:txBody>
-      </p:sp>
-      <p:pic>
-        <p:nvPicPr>
-          <p:cNvPr id="136" name="Picture 2" descr="Resultado de imagem para logo ipt">
-            <a:extLst>
-              <a:ext uri="{FF2B5EF4-FFF2-40B4-BE49-F238E27FC236}">
-                <a16:creationId xmlns:a16="http://schemas.microsoft.com/office/drawing/2014/main" id="{F36824C3-5B0E-9A4C-8829-1E30642EC36B}"/>
-              </a:ext>
-            </a:extLst>
-          </p:cNvPr>
-          <p:cNvPicPr>
-            <a:picLocks noChangeAspect="1" noChangeArrowheads="1"/>
-          </p:cNvPicPr>
-          <p:nvPr/>
-        </p:nvPicPr>
-        <p:blipFill>
-          <a:blip r:embed="rId2">
-            <a:extLst>
-              <a:ext uri="{28A0092B-C50C-407E-A947-70E740481C1C}">
-                <a14:useLocalDpi xmlns:a14="http://schemas.microsoft.com/office/drawing/2010/main" val="0"/>
-              </a:ext>
-            </a:extLst>
-          </a:blip>
-          <a:srcRect/>
-          <a:stretch>
-            <a:fillRect/>
-          </a:stretch>
-        </p:blipFill>
-        <p:spPr bwMode="auto">
-          <a:xfrm>
-            <a:off x="9668267" y="365125"/>
-            <a:ext cx="1885950" cy="914401"/>
-          </a:xfrm>
-          <a:prstGeom prst="rect">
-            <a:avLst/>
-          </a:prstGeom>
-          <a:noFill/>
-          <a:extLst>
-            <a:ext uri="{909E8E84-426E-40DD-AFC4-6F175D3DCCD1}">
-              <a14:hiddenFill xmlns:a14="http://schemas.microsoft.com/office/drawing/2010/main">
-                <a:solidFill>
-                  <a:srgbClr val="FFFFFF"/>
-                </a:solidFill>
-              </a14:hiddenFill>
-            </a:ext>
-          </a:extLst>
-        </p:spPr>
-      </p:pic>
+          <p:cNvGraphicFramePr>
+            <a:graphicFrameLocks noGrp="1"/>
+          </p:cNvGraphicFramePr>
+          <p:nvPr>
+            <p:extLst>
+              <p:ext uri="{D42A27DB-BD31-4B8C-83A1-F6EECF244321}">
+                <p14:modId xmlns:p14="http://schemas.microsoft.com/office/powerpoint/2010/main" val="1314601710"/>
+              </p:ext>
+            </p:extLst>
+          </p:nvPr>
+        </p:nvGraphicFramePr>
+        <p:xfrm>
+          <a:off x="1384300" y="2535766"/>
+          <a:ext cx="8128000" cy="1854200"/>
+        </p:xfrm>
+        <a:graphic>
+          <a:graphicData uri="http://schemas.openxmlformats.org/drawingml/2006/table">
+            <a:tbl>
+              <a:tblPr firstRow="1" bandRow="1">
+                <a:tableStyleId>{5C22544A-7EE6-4342-B048-85BDC9FD1C3A}</a:tableStyleId>
+              </a:tblPr>
+              <a:tblGrid>
+                <a:gridCol w="4064000">
+                  <a:extLst>
+                    <a:ext uri="{9D8B030D-6E8A-4147-A177-3AD203B41FA5}">
+                      <a16:colId xmlns:a16="http://schemas.microsoft.com/office/drawing/2014/main" val="3493909962"/>
+                    </a:ext>
+                  </a:extLst>
+                </a:gridCol>
+                <a:gridCol w="4064000">
+                  <a:extLst>
+                    <a:ext uri="{9D8B030D-6E8A-4147-A177-3AD203B41FA5}">
+                      <a16:colId xmlns:a16="http://schemas.microsoft.com/office/drawing/2014/main" val="742120372"/>
+                    </a:ext>
+                  </a:extLst>
+                </a:gridCol>
+              </a:tblGrid>
+              <a:tr h="370840">
+                <a:tc>
+                  <a:txBody>
+                    <a:bodyPr/>
+                    <a:lstStyle/>
+                    <a:p>
+                      <a:endParaRPr lang="en-US" dirty="0"/>
+                    </a:p>
+                  </a:txBody>
+                  <a:tcPr/>
+                </a:tc>
+                <a:tc>
+                  <a:txBody>
+                    <a:bodyPr/>
+                    <a:lstStyle/>
+                    <a:p>
+                      <a:r>
+                        <a:rPr lang="en-US" dirty="0" err="1"/>
+                        <a:t>Quantidade</a:t>
+                      </a:r>
+                      <a:endParaRPr lang="en-US" dirty="0"/>
+                    </a:p>
+                  </a:txBody>
+                  <a:tcPr/>
+                </a:tc>
+                <a:extLst>
+                  <a:ext uri="{0D108BD9-81ED-4DB2-BD59-A6C34878D82A}">
+                    <a16:rowId xmlns:a16="http://schemas.microsoft.com/office/drawing/2014/main" val="389437612"/>
+                  </a:ext>
+                </a:extLst>
+              </a:tr>
+              <a:tr h="370840">
+                <a:tc>
+                  <a:txBody>
+                    <a:bodyPr/>
+                    <a:lstStyle/>
+                    <a:p>
+                      <a:r>
+                        <a:rPr lang="en-US" dirty="0" err="1"/>
+                        <a:t>Aceitos</a:t>
+                      </a:r>
+                      <a:endParaRPr lang="en-US" dirty="0"/>
+                    </a:p>
+                  </a:txBody>
+                  <a:tcPr/>
+                </a:tc>
+                <a:tc>
+                  <a:txBody>
+                    <a:bodyPr/>
+                    <a:lstStyle/>
+                    <a:p>
+                      <a:pPr algn="r"/>
+                      <a:r>
+                        <a:rPr lang="en-US" dirty="0"/>
+                        <a:t>20</a:t>
+                      </a:r>
+                    </a:p>
+                  </a:txBody>
+                  <a:tcPr/>
+                </a:tc>
+                <a:extLst>
+                  <a:ext uri="{0D108BD9-81ED-4DB2-BD59-A6C34878D82A}">
+                    <a16:rowId xmlns:a16="http://schemas.microsoft.com/office/drawing/2014/main" val="1898093246"/>
+                  </a:ext>
+                </a:extLst>
+              </a:tr>
+              <a:tr h="370840">
+                <a:tc>
+                  <a:txBody>
+                    <a:bodyPr/>
+                    <a:lstStyle/>
+                    <a:p>
+                      <a:r>
+                        <a:rPr lang="en-US" dirty="0" err="1"/>
+                        <a:t>Rejeitados</a:t>
+                      </a:r>
+                      <a:endParaRPr lang="en-US" dirty="0"/>
+                    </a:p>
+                  </a:txBody>
+                  <a:tcPr/>
+                </a:tc>
+                <a:tc>
+                  <a:txBody>
+                    <a:bodyPr/>
+                    <a:lstStyle/>
+                    <a:p>
+                      <a:pPr algn="r"/>
+                      <a:r>
+                        <a:rPr lang="en-US" dirty="0"/>
+                        <a:t>17</a:t>
+                      </a:r>
+                    </a:p>
+                  </a:txBody>
+                  <a:tcPr/>
+                </a:tc>
+                <a:extLst>
+                  <a:ext uri="{0D108BD9-81ED-4DB2-BD59-A6C34878D82A}">
+                    <a16:rowId xmlns:a16="http://schemas.microsoft.com/office/drawing/2014/main" val="296662238"/>
+                  </a:ext>
+                </a:extLst>
+              </a:tr>
+              <a:tr h="370840">
+                <a:tc>
+                  <a:txBody>
+                    <a:bodyPr/>
+                    <a:lstStyle/>
+                    <a:p>
+                      <a:r>
+                        <a:rPr lang="en-US" dirty="0" err="1"/>
+                        <a:t>Duplicados</a:t>
+                      </a:r>
+                      <a:endParaRPr lang="en-US" dirty="0"/>
+                    </a:p>
+                  </a:txBody>
+                  <a:tcPr/>
+                </a:tc>
+                <a:tc>
+                  <a:txBody>
+                    <a:bodyPr/>
+                    <a:lstStyle/>
+                    <a:p>
+                      <a:pPr algn="r"/>
+                      <a:r>
+                        <a:rPr lang="en-US" dirty="0"/>
+                        <a:t>40</a:t>
+                      </a:r>
+                    </a:p>
+                  </a:txBody>
+                  <a:tcPr/>
+                </a:tc>
+                <a:extLst>
+                  <a:ext uri="{0D108BD9-81ED-4DB2-BD59-A6C34878D82A}">
+                    <a16:rowId xmlns:a16="http://schemas.microsoft.com/office/drawing/2014/main" val="1272319594"/>
+                  </a:ext>
+                </a:extLst>
+              </a:tr>
+              <a:tr h="370840">
+                <a:tc>
+                  <a:txBody>
+                    <a:bodyPr/>
+                    <a:lstStyle/>
+                    <a:p>
+                      <a:r>
+                        <a:rPr lang="en-US" dirty="0" err="1"/>
+                        <a:t>Não</a:t>
+                      </a:r>
+                      <a:r>
+                        <a:rPr lang="en-US" dirty="0"/>
+                        <a:t> </a:t>
+                      </a:r>
+                      <a:r>
+                        <a:rPr lang="en-US" dirty="0" err="1"/>
+                        <a:t>classificados</a:t>
+                      </a:r>
+                      <a:endParaRPr lang="en-US" dirty="0"/>
+                    </a:p>
+                  </a:txBody>
+                  <a:tcPr/>
+                </a:tc>
+                <a:tc>
+                  <a:txBody>
+                    <a:bodyPr/>
+                    <a:lstStyle/>
+                    <a:p>
+                      <a:pPr algn="r"/>
+                      <a:r>
+                        <a:rPr lang="en-US" dirty="0"/>
+                        <a:t>167</a:t>
+                      </a:r>
+                    </a:p>
+                  </a:txBody>
+                  <a:tcPr/>
+                </a:tc>
+                <a:extLst>
+                  <a:ext uri="{0D108BD9-81ED-4DB2-BD59-A6C34878D82A}">
+                    <a16:rowId xmlns:a16="http://schemas.microsoft.com/office/drawing/2014/main" val="2141438738"/>
+                  </a:ext>
+                </a:extLst>
+              </a:tr>
+            </a:tbl>
+          </a:graphicData>
+        </a:graphic>
+      </p:graphicFrame>
     </p:spTree>
     <p:extLst>
       <p:ext uri="{BB962C8B-B14F-4D97-AF65-F5344CB8AC3E}">
-        <p14:creationId xmlns:p14="http://schemas.microsoft.com/office/powerpoint/2010/main" val="355158128"/>
+        <p14:creationId xmlns:p14="http://schemas.microsoft.com/office/powerpoint/2010/main" val="1443947575"/>
       </p:ext>
     </p:extLst>
   </p:cSld>
@@ -24711,7 +22411,7 @@
         <p:spPr>
           <a:xfrm>
             <a:off x="8947658" y="2925880"/>
-            <a:ext cx="2105412" cy="923330"/>
+            <a:ext cx="2105412" cy="1477328"/>
           </a:xfrm>
           <a:prstGeom prst="rect">
             <a:avLst/>
@@ -24740,7 +22440,7 @@
             </a:pPr>
             <a:r>
               <a:rPr lang="en-US" dirty="0"/>
-              <a:t>Syntax Based</a:t>
+              <a:t>Feature extraction</a:t>
             </a:r>
           </a:p>
           <a:p>
@@ -24750,7 +22450,7 @@
             </a:pPr>
             <a:r>
               <a:rPr lang="en-US" dirty="0"/>
-              <a:t>Token Based</a:t>
+              <a:t>Representation learning</a:t>
             </a:r>
           </a:p>
         </p:txBody>
@@ -24819,7 +22519,7 @@
         <p:spPr>
           <a:xfrm>
             <a:off x="9074534" y="5605780"/>
-            <a:ext cx="2105412" cy="1200329"/>
+            <a:ext cx="2105412" cy="369332"/>
           </a:xfrm>
           <a:prstGeom prst="rect">
             <a:avLst/>
@@ -24840,23 +22540,6 @@
               <a:rPr lang="en-US" dirty="0"/>
               <a:t>Program analysis</a:t>
             </a:r>
-          </a:p>
-          <a:p>
-            <a:pPr marL="285750" indent="-285750">
-              <a:buFont typeface="Arial" panose="020B0604020202020204" pitchFamily="34" charset="0"/>
-              <a:buChar char="•"/>
-            </a:pPr>
-            <a:r>
-              <a:rPr lang="en-US" dirty="0"/>
-              <a:t>Program representation</a:t>
-            </a:r>
-          </a:p>
-          <a:p>
-            <a:pPr marL="285750" indent="-285750">
-              <a:buFont typeface="Arial" panose="020B0604020202020204" pitchFamily="34" charset="0"/>
-              <a:buChar char="•"/>
-            </a:pPr>
-            <a:endParaRPr lang="en-US" dirty="0"/>
           </a:p>
         </p:txBody>
       </p:sp>
@@ -25415,23 +23098,7 @@
                   <a:schemeClr val="accent6"/>
                 </a:solidFill>
               </a:rPr>
-              <a:t>"Word </a:t>
-            </a:r>
-            <a:r>
-              <a:rPr lang="en-US" sz="1400" dirty="0" err="1">
-                <a:solidFill>
-                  <a:schemeClr val="accent6"/>
-                </a:solidFill>
-              </a:rPr>
-              <a:t>embeddings</a:t>
-            </a:r>
-            <a:r>
-              <a:rPr lang="en-US" sz="1400" dirty="0">
-                <a:solidFill>
-                  <a:schemeClr val="accent6"/>
-                </a:solidFill>
-              </a:rPr>
-              <a:t>"  </a:t>
+              <a:t>”word embedding"  </a:t>
             </a:r>
             <a:r>
               <a:rPr lang="en-US" sz="1400" b="1" dirty="0">
@@ -25447,7 +23114,7 @@
                   <a:schemeClr val="accent6"/>
                 </a:solidFill>
               </a:rPr>
-              <a:t>  "program embedding"  </a:t>
+              <a:t>  ”feature extraction"  </a:t>
             </a:r>
             <a:r>
               <a:rPr lang="en-US" sz="1400" b="1" dirty="0">
@@ -25463,7 +23130,7 @@
                   <a:schemeClr val="accent6"/>
                 </a:solidFill>
               </a:rPr>
-              <a:t>  "syntax tree"  </a:t>
+              <a:t>  ”representation learning"  </a:t>
             </a:r>
             <a:r>
               <a:rPr lang="en-US" sz="1400" b="1" dirty="0">
@@ -25479,7 +23146,7 @@
                   <a:schemeClr val="accent6"/>
                 </a:solidFill>
               </a:rPr>
-              <a:t>  "syntax based"  </a:t>
+              <a:t>  "syntax"  </a:t>
             </a:r>
             <a:r>
               <a:rPr lang="en-US" sz="1400" b="1" dirty="0">
@@ -25495,7 +23162,23 @@
                   <a:schemeClr val="accent6"/>
                 </a:solidFill>
               </a:rPr>
-              <a:t>  "token based"</a:t>
+              <a:t>  "token” </a:t>
+            </a:r>
+            <a:r>
+              <a:rPr lang="en-US" sz="1400" b="1" dirty="0">
+                <a:solidFill>
+                  <a:schemeClr val="accent6"/>
+                </a:solidFill>
+              </a:rPr>
+              <a:t>OR</a:t>
+            </a:r>
+            <a:r>
+              <a:rPr lang="en-US" sz="1400" dirty="0">
+                <a:solidFill>
+                  <a:schemeClr val="accent6"/>
+                </a:solidFill>
+              </a:rPr>
+              <a:t> “trace”</a:t>
             </a:r>
             <a:r>
               <a:rPr lang="en-US" sz="1400" dirty="0"/>
@@ -25802,7 +23485,7 @@
                   <a:schemeClr val="accent2"/>
                 </a:solidFill>
               </a:rPr>
-              <a:t>  "student"  </a:t>
+              <a:t>  "massive open online course"  </a:t>
             </a:r>
             <a:r>
               <a:rPr lang="en-US" sz="1400" b="1" dirty="0">
@@ -25818,7 +23501,23 @@
                   <a:schemeClr val="accent2"/>
                 </a:solidFill>
               </a:rPr>
-              <a:t>  "massive open online course"  </a:t>
+              <a:t>  "</a:t>
+            </a:r>
+            <a:r>
+              <a:rPr lang="en-US" sz="1400" dirty="0" err="1">
+                <a:solidFill>
+                  <a:schemeClr val="accent2"/>
+                </a:solidFill>
+              </a:rPr>
+              <a:t>mooc</a:t>
+            </a:r>
+            <a:r>
+              <a:rPr lang="en-US" sz="1400" dirty="0">
+                <a:solidFill>
+                  <a:schemeClr val="accent2"/>
+                </a:solidFill>
+              </a:rPr>
+              <a:t>" </a:t>
             </a:r>
             <a:r>
               <a:rPr lang="en-US" sz="1400" b="1" dirty="0">
@@ -25834,23 +23533,11 @@
                   <a:schemeClr val="accent2"/>
                 </a:solidFill>
               </a:rPr>
-              <a:t>  "</a:t>
-            </a:r>
-            <a:r>
-              <a:rPr lang="en-US" sz="1400" dirty="0" err="1">
-                <a:solidFill>
-                  <a:schemeClr val="accent2"/>
-                </a:solidFill>
-              </a:rPr>
-              <a:t>mooc</a:t>
-            </a:r>
-            <a:r>
-              <a:rPr lang="en-US" sz="1400" dirty="0">
-                <a:solidFill>
-                  <a:schemeClr val="accent2"/>
-                </a:solidFill>
-              </a:rPr>
-              <a:t>"  </a:t>
+              <a:t>  "introductory programming”</a:t>
+            </a:r>
+            <a:r>
+              <a:rPr lang="en-US" sz="1400" dirty="0"/>
+              <a:t>  </a:t>
             </a:r>
             <a:r>
               <a:rPr lang="en-US" sz="1400" b="1" dirty="0">
@@ -25866,27 +23553,7 @@
                   <a:schemeClr val="accent2"/>
                 </a:solidFill>
               </a:rPr>
-              <a:t>  "big code"  </a:t>
-            </a:r>
-            <a:r>
-              <a:rPr lang="en-US" sz="1400" b="1" dirty="0">
-                <a:solidFill>
-                  <a:schemeClr val="accent2"/>
-                </a:solidFill>
-              </a:rPr>
-              <a:t>OR</a:t>
-            </a:r>
-            <a:r>
-              <a:rPr lang="en-US" sz="1400" dirty="0">
-                <a:solidFill>
-                  <a:schemeClr val="accent2"/>
-                </a:solidFill>
-              </a:rPr>
-              <a:t>  "introductory programming”</a:t>
-            </a:r>
-            <a:r>
-              <a:rPr lang="en-US" sz="1400" dirty="0"/>
-              <a:t> </a:t>
+              <a:t>  “student”</a:t>
             </a:r>
           </a:p>
           <a:p>
@@ -25912,7 +23579,7 @@
                   <a:srgbClr val="7030A0"/>
                 </a:solidFill>
               </a:rPr>
-              <a:t>"open source" </a:t>
+              <a:t>"big code” </a:t>
             </a:r>
             <a:r>
               <a:rPr lang="en-US" sz="1400" b="1" dirty="0">
@@ -25928,7 +23595,7 @@
                   <a:srgbClr val="7030A0"/>
                 </a:solidFill>
               </a:rPr>
-              <a:t> "source code"  </a:t>
+              <a:t> "open source" </a:t>
             </a:r>
             <a:r>
               <a:rPr lang="en-US" sz="1400" b="1" dirty="0">
@@ -25944,7 +23611,7 @@
                   <a:srgbClr val="7030A0"/>
                 </a:solidFill>
               </a:rPr>
-              <a:t>  "program analysis"  </a:t>
+              <a:t> "source code"  </a:t>
             </a:r>
             <a:r>
               <a:rPr lang="en-US" sz="1400" b="1" dirty="0">
@@ -25960,23 +23627,7 @@
                   <a:srgbClr val="7030A0"/>
                 </a:solidFill>
               </a:rPr>
-              <a:t>  "Program representation"  </a:t>
-            </a:r>
-            <a:r>
-              <a:rPr lang="en-US" sz="1400" b="1" dirty="0">
-                <a:solidFill>
-                  <a:srgbClr val="7030A0"/>
-                </a:solidFill>
-              </a:rPr>
-              <a:t>OR</a:t>
-            </a:r>
-            <a:r>
-              <a:rPr lang="en-US" sz="1400" dirty="0">
-                <a:solidFill>
-                  <a:srgbClr val="7030A0"/>
-                </a:solidFill>
-              </a:rPr>
-              <a:t>  "Program classification"</a:t>
+              <a:t>  "program analysis"</a:t>
             </a:r>
             <a:r>
               <a:rPr lang="en-US" sz="2400" dirty="0"/>

</xml_diff>